<commit_message>
Add SQL Query to insert sample cars. Update presentation.
</commit_message>
<xml_diff>
--- a/sqsdemoserver/LoadTesting.pptx
+++ b/sqsdemoserver/LoadTesting.pptx
@@ -17,11 +17,11 @@
     <p:sldId id="262" r:id="rId8"/>
     <p:sldId id="266" r:id="rId9"/>
     <p:sldId id="274" r:id="rId10"/>
-    <p:sldId id="267" r:id="rId11"/>
-    <p:sldId id="269" r:id="rId12"/>
-    <p:sldId id="265" r:id="rId13"/>
-    <p:sldId id="270" r:id="rId14"/>
-    <p:sldId id="273" r:id="rId15"/>
+    <p:sldId id="275" r:id="rId11"/>
+    <p:sldId id="276" r:id="rId12"/>
+    <p:sldId id="267" r:id="rId13"/>
+    <p:sldId id="269" r:id="rId14"/>
+    <p:sldId id="265" r:id="rId15"/>
     <p:sldId id="271" r:id="rId16"/>
     <p:sldId id="272" r:id="rId17"/>
     <p:sldId id="259" r:id="rId18"/>
@@ -217,7 +217,7 @@
           <a:p>
             <a:fld id="{7F7A1CCF-3A8B-40F6-A64D-2A4687177E43}" type="datetimeFigureOut">
               <a:rPr lang="de-DE" smtClean="0"/>
-              <a:t>14.05.2018</a:t>
+              <a:t>21.05.2018</a:t>
             </a:fld>
             <a:endParaRPr lang="de-DE"/>
           </a:p>
@@ -710,7 +710,7 @@
           <a:p>
             <a:fld id="{29B91BC4-5E82-49A6-88C1-D8535ED7D15D}" type="datetime1">
               <a:rPr lang="de-DE" smtClean="0"/>
-              <a:t>14.05.2018</a:t>
+              <a:t>21.05.2018</a:t>
             </a:fld>
             <a:endParaRPr lang="de-DE"/>
           </a:p>
@@ -918,7 +918,7 @@
           <a:p>
             <a:fld id="{32A52664-B2C7-4A1E-B89B-81D348E24B51}" type="datetime1">
               <a:rPr lang="de-DE" smtClean="0"/>
-              <a:t>14.05.2018</a:t>
+              <a:t>21.05.2018</a:t>
             </a:fld>
             <a:endParaRPr lang="de-DE"/>
           </a:p>
@@ -1174,7 +1174,7 @@
           <a:p>
             <a:fld id="{87A80DC5-21AA-41FB-A73E-ED981639E9E3}" type="datetime1">
               <a:rPr lang="de-DE" smtClean="0"/>
-              <a:t>14.05.2018</a:t>
+              <a:t>21.05.2018</a:t>
             </a:fld>
             <a:endParaRPr lang="de-DE"/>
           </a:p>
@@ -1344,7 +1344,7 @@
           <a:p>
             <a:fld id="{BBFFFFB7-B427-4FC9-89B5-E815E530C709}" type="datetime1">
               <a:rPr lang="de-DE" smtClean="0"/>
-              <a:t>14.05.2018</a:t>
+              <a:t>21.05.2018</a:t>
             </a:fld>
             <a:endParaRPr lang="de-DE"/>
           </a:p>
@@ -1687,7 +1687,7 @@
           <a:p>
             <a:fld id="{9B4A11A6-692F-4D3F-A6E0-135304D8649E}" type="datetime1">
               <a:rPr lang="de-DE" smtClean="0"/>
-              <a:t>14.05.2018</a:t>
+              <a:t>21.05.2018</a:t>
             </a:fld>
             <a:endParaRPr lang="de-DE"/>
           </a:p>
@@ -1962,7 +1962,7 @@
           <a:p>
             <a:fld id="{2FF197E6-8FE2-43C3-B517-8EF10A23BA5B}" type="datetime1">
               <a:rPr lang="de-DE" smtClean="0"/>
-              <a:t>14.05.2018</a:t>
+              <a:t>21.05.2018</a:t>
             </a:fld>
             <a:endParaRPr lang="de-DE"/>
           </a:p>
@@ -2341,7 +2341,7 @@
           <a:p>
             <a:fld id="{88AD5C22-0615-445E-B37E-053106C142C7}" type="datetime1">
               <a:rPr lang="de-DE" smtClean="0"/>
-              <a:t>14.05.2018</a:t>
+              <a:t>21.05.2018</a:t>
             </a:fld>
             <a:endParaRPr lang="de-DE"/>
           </a:p>
@@ -2459,7 +2459,7 @@
           <a:p>
             <a:fld id="{393C4718-61D0-4C05-A837-0FF64CDC070F}" type="datetime1">
               <a:rPr lang="de-DE" smtClean="0"/>
-              <a:t>14.05.2018</a:t>
+              <a:t>21.05.2018</a:t>
             </a:fld>
             <a:endParaRPr lang="de-DE"/>
           </a:p>
@@ -2630,7 +2630,7 @@
           <a:p>
             <a:fld id="{E4C68F9C-9493-41F8-A598-7BDB27153DE0}" type="datetime1">
               <a:rPr lang="de-DE" smtClean="0"/>
-              <a:t>14.05.2018</a:t>
+              <a:t>21.05.2018</a:t>
             </a:fld>
             <a:endParaRPr lang="de-DE"/>
           </a:p>
@@ -2984,7 +2984,7 @@
           <a:p>
             <a:fld id="{25B47950-BAF5-4EB0-B7D8-7E5D445A5AF9}" type="datetime1">
               <a:rPr lang="de-DE" smtClean="0"/>
-              <a:t>14.05.2018</a:t>
+              <a:t>21.05.2018</a:t>
             </a:fld>
             <a:endParaRPr lang="de-DE"/>
           </a:p>
@@ -3361,7 +3361,7 @@
           <a:p>
             <a:fld id="{5E3FA0F3-663C-4E4D-A9AD-FCEECA59737D}" type="datetime1">
               <a:rPr lang="de-DE" smtClean="0"/>
-              <a:t>14.05.2018</a:t>
+              <a:t>21.05.2018</a:t>
             </a:fld>
             <a:endParaRPr lang="de-DE"/>
           </a:p>
@@ -3648,7 +3648,7 @@
           <a:p>
             <a:fld id="{7E243A8A-9070-4D02-9F6C-FDBBE4C2268D}" type="datetime1">
               <a:rPr lang="de-DE" smtClean="0"/>
-              <a:t>14.05.2018</a:t>
+              <a:t>21.05.2018</a:t>
             </a:fld>
             <a:endParaRPr lang="de-DE"/>
           </a:p>
@@ -4300,7 +4300,7 @@
           <p:cNvPr id="2" name="Titel 1">
             <a:extLst>
               <a:ext uri="{FF2B5EF4-FFF2-40B4-BE49-F238E27FC236}">
-                <a16:creationId xmlns:a16="http://schemas.microsoft.com/office/drawing/2014/main" id="{FC5E778E-2A11-4C1E-8D8C-273067E4E86A}"/>
+                <a16:creationId xmlns:a16="http://schemas.microsoft.com/office/drawing/2014/main" id="{791A2B02-5491-481A-89B6-7E421EAB1E96}"/>
               </a:ext>
             </a:extLst>
           </p:cNvPr>
@@ -4317,8 +4317,61 @@
           <a:lstStyle/>
           <a:p>
             <a:r>
+              <a:rPr lang="de-DE" dirty="0" err="1"/>
+              <a:t>Slapper</a:t>
+            </a:r>
+            <a:endParaRPr lang="de-DE" dirty="0"/>
+          </a:p>
+        </p:txBody>
+      </p:sp>
+      <p:sp>
+        <p:nvSpPr>
+          <p:cNvPr id="3" name="Inhaltsplatzhalter 2">
+            <a:extLst>
+              <a:ext uri="{FF2B5EF4-FFF2-40B4-BE49-F238E27FC236}">
+                <a16:creationId xmlns:a16="http://schemas.microsoft.com/office/drawing/2014/main" id="{8EE37BAC-8E0B-4202-A812-97ABED453C31}"/>
+              </a:ext>
+            </a:extLst>
+          </p:cNvPr>
+          <p:cNvSpPr>
+            <a:spLocks noGrp="1"/>
+          </p:cNvSpPr>
+          <p:nvPr>
+            <p:ph idx="1"/>
+          </p:nvPr>
+        </p:nvSpPr>
+        <p:spPr/>
+        <p:txBody>
+          <a:bodyPr/>
+          <a:lstStyle/>
+          <a:p>
+            <a:pPr>
+              <a:buFont typeface="Arial" panose="020B0604020202020204" pitchFamily="34" charset="0"/>
+              <a:buChar char="•"/>
+            </a:pPr>
+            <a:r>
               <a:rPr lang="de-DE" dirty="0"/>
-              <a:t>k6 </a:t>
+              <a:t> 2017 gestartet (keine offizielle Versionsnummer)</a:t>
+            </a:r>
+          </a:p>
+          <a:p>
+            <a:pPr>
+              <a:buFont typeface="Arial" panose="020B0604020202020204" pitchFamily="34" charset="0"/>
+              <a:buChar char="•"/>
+            </a:pPr>
+            <a:r>
+              <a:rPr lang="de-DE" dirty="0"/>
+              <a:t> Programmiersprache: GO</a:t>
+            </a:r>
+          </a:p>
+          <a:p>
+            <a:pPr>
+              <a:buFont typeface="Arial" panose="020B0604020202020204" pitchFamily="34" charset="0"/>
+              <a:buChar char="•"/>
+            </a:pPr>
+            <a:r>
+              <a:rPr lang="de-DE" dirty="0"/>
+              <a:t> MIT Lizenz</a:t>
             </a:r>
           </a:p>
         </p:txBody>
@@ -4328,7 +4381,7 @@
           <p:cNvPr id="4" name="Datumsplatzhalter 3">
             <a:extLst>
               <a:ext uri="{FF2B5EF4-FFF2-40B4-BE49-F238E27FC236}">
-                <a16:creationId xmlns:a16="http://schemas.microsoft.com/office/drawing/2014/main" id="{DD0D5017-119E-4C58-9EF9-8EA436CBC7DC}"/>
+                <a16:creationId xmlns:a16="http://schemas.microsoft.com/office/drawing/2014/main" id="{B508518C-1EF4-4C8C-9793-A0CB377BFA3A}"/>
               </a:ext>
             </a:extLst>
           </p:cNvPr>
@@ -4346,7 +4399,7 @@
           <a:p>
             <a:fld id="{BBFFFFB7-B427-4FC9-89B5-E815E530C709}" type="datetime1">
               <a:rPr lang="de-DE" smtClean="0"/>
-              <a:t>14.05.2018</a:t>
+              <a:t>21.05.2018</a:t>
             </a:fld>
             <a:endParaRPr lang="de-DE"/>
           </a:p>
@@ -4357,7 +4410,7 @@
           <p:cNvPr id="5" name="Foliennummernplatzhalter 4">
             <a:extLst>
               <a:ext uri="{FF2B5EF4-FFF2-40B4-BE49-F238E27FC236}">
-                <a16:creationId xmlns:a16="http://schemas.microsoft.com/office/drawing/2014/main" id="{942EAD44-7938-41E8-BB37-7A5A16FC2BD2}"/>
+                <a16:creationId xmlns:a16="http://schemas.microsoft.com/office/drawing/2014/main" id="{CA3F5E5F-893B-40E2-B8FC-9D4D715F3F41}"/>
               </a:ext>
             </a:extLst>
           </p:cNvPr>
@@ -4376,6 +4429,404 @@
             <a:fld id="{C9BFD74B-BF5B-4F1B-BDFB-3F89FD2A71A6}" type="slidenum">
               <a:rPr lang="de-DE" smtClean="0"/>
               <a:t>10</a:t>
+            </a:fld>
+            <a:endParaRPr lang="de-DE"/>
+          </a:p>
+        </p:txBody>
+      </p:sp>
+      <p:pic>
+        <p:nvPicPr>
+          <p:cNvPr id="6" name="Grafik 5">
+            <a:extLst>
+              <a:ext uri="{FF2B5EF4-FFF2-40B4-BE49-F238E27FC236}">
+                <a16:creationId xmlns:a16="http://schemas.microsoft.com/office/drawing/2014/main" id="{353CE577-4D49-496A-B2EB-D15F2A8CA50C}"/>
+              </a:ext>
+            </a:extLst>
+          </p:cNvPr>
+          <p:cNvPicPr>
+            <a:picLocks noChangeAspect="1"/>
+          </p:cNvPicPr>
+          <p:nvPr/>
+        </p:nvPicPr>
+        <p:blipFill>
+          <a:blip r:embed="rId2"/>
+          <a:stretch>
+            <a:fillRect/>
+          </a:stretch>
+        </p:blipFill>
+        <p:spPr>
+          <a:xfrm>
+            <a:off x="1097280" y="3757668"/>
+            <a:ext cx="10115203" cy="2111426"/>
+          </a:xfrm>
+          <a:prstGeom prst="rect">
+            <a:avLst/>
+          </a:prstGeom>
+        </p:spPr>
+      </p:pic>
+    </p:spTree>
+    <p:extLst>
+      <p:ext uri="{BB962C8B-B14F-4D97-AF65-F5344CB8AC3E}">
+        <p14:creationId xmlns:p14="http://schemas.microsoft.com/office/powerpoint/2010/main" val="1316422767"/>
+      </p:ext>
+    </p:extLst>
+  </p:cSld>
+  <p:clrMapOvr>
+    <a:masterClrMapping/>
+  </p:clrMapOvr>
+</p:sld>
+</file>
+
+<file path=ppt/slides/slide11.xml><?xml version="1.0" encoding="utf-8"?>
+<p:sld xmlns:a="http://schemas.openxmlformats.org/drawingml/2006/main" xmlns:r="http://schemas.openxmlformats.org/officeDocument/2006/relationships" xmlns:p="http://schemas.openxmlformats.org/presentationml/2006/main">
+  <p:cSld>
+    <p:spTree>
+      <p:nvGrpSpPr>
+        <p:cNvPr id="1" name=""/>
+        <p:cNvGrpSpPr/>
+        <p:nvPr/>
+      </p:nvGrpSpPr>
+      <p:grpSpPr>
+        <a:xfrm>
+          <a:off x="0" y="0"/>
+          <a:ext cx="0" cy="0"/>
+          <a:chOff x="0" y="0"/>
+          <a:chExt cx="0" cy="0"/>
+        </a:xfrm>
+      </p:grpSpPr>
+      <p:sp>
+        <p:nvSpPr>
+          <p:cNvPr id="2" name="Titel 1">
+            <a:extLst>
+              <a:ext uri="{FF2B5EF4-FFF2-40B4-BE49-F238E27FC236}">
+                <a16:creationId xmlns:a16="http://schemas.microsoft.com/office/drawing/2014/main" id="{53F591E6-C222-4F39-91C1-C18A6B94B52E}"/>
+              </a:ext>
+            </a:extLst>
+          </p:cNvPr>
+          <p:cNvSpPr>
+            <a:spLocks noGrp="1"/>
+          </p:cNvSpPr>
+          <p:nvPr>
+            <p:ph type="title"/>
+          </p:nvPr>
+        </p:nvSpPr>
+        <p:spPr/>
+        <p:txBody>
+          <a:bodyPr/>
+          <a:lstStyle/>
+          <a:p>
+            <a:r>
+              <a:rPr lang="de-DE" dirty="0" err="1"/>
+              <a:t>Artillery</a:t>
+            </a:r>
+            <a:endParaRPr lang="de-DE" dirty="0"/>
+          </a:p>
+        </p:txBody>
+      </p:sp>
+      <p:sp>
+        <p:nvSpPr>
+          <p:cNvPr id="3" name="Inhaltsplatzhalter 2">
+            <a:extLst>
+              <a:ext uri="{FF2B5EF4-FFF2-40B4-BE49-F238E27FC236}">
+                <a16:creationId xmlns:a16="http://schemas.microsoft.com/office/drawing/2014/main" id="{AFE79C1D-6B17-4ECD-8C42-D5FC65C79D42}"/>
+              </a:ext>
+            </a:extLst>
+          </p:cNvPr>
+          <p:cNvSpPr>
+            <a:spLocks noGrp="1"/>
+          </p:cNvSpPr>
+          <p:nvPr>
+            <p:ph idx="1"/>
+          </p:nvPr>
+        </p:nvSpPr>
+        <p:spPr/>
+        <p:txBody>
+          <a:bodyPr/>
+          <a:lstStyle/>
+          <a:p>
+            <a:pPr>
+              <a:buFont typeface="Arial" panose="020B0604020202020204" pitchFamily="34" charset="0"/>
+              <a:buChar char="•"/>
+            </a:pPr>
+            <a:r>
+              <a:rPr lang="de-DE" dirty="0"/>
+              <a:t> 2016 veröffentlicht (aktuell in Version 1.5.6)</a:t>
+            </a:r>
+          </a:p>
+          <a:p>
+            <a:pPr>
+              <a:buFont typeface="Arial" panose="020B0604020202020204" pitchFamily="34" charset="0"/>
+              <a:buChar char="•"/>
+            </a:pPr>
+            <a:r>
+              <a:rPr lang="de-DE" dirty="0"/>
+              <a:t> MPL-2.0 Lizenz</a:t>
+            </a:r>
+          </a:p>
+          <a:p>
+            <a:pPr>
+              <a:buFont typeface="Arial" panose="020B0604020202020204" pitchFamily="34" charset="0"/>
+              <a:buChar char="•"/>
+            </a:pPr>
+            <a:r>
+              <a:rPr lang="de-DE" dirty="0"/>
+              <a:t> Programmiersprache: Node.js</a:t>
+            </a:r>
+          </a:p>
+          <a:p>
+            <a:pPr marL="0" indent="0">
+              <a:buNone/>
+            </a:pPr>
+            <a:endParaRPr lang="de-DE" dirty="0"/>
+          </a:p>
+        </p:txBody>
+      </p:sp>
+      <p:sp>
+        <p:nvSpPr>
+          <p:cNvPr id="4" name="Datumsplatzhalter 3">
+            <a:extLst>
+              <a:ext uri="{FF2B5EF4-FFF2-40B4-BE49-F238E27FC236}">
+                <a16:creationId xmlns:a16="http://schemas.microsoft.com/office/drawing/2014/main" id="{DE99C92B-372D-4793-B061-7725AF98137E}"/>
+              </a:ext>
+            </a:extLst>
+          </p:cNvPr>
+          <p:cNvSpPr>
+            <a:spLocks noGrp="1"/>
+          </p:cNvSpPr>
+          <p:nvPr>
+            <p:ph type="dt" sz="half" idx="10"/>
+          </p:nvPr>
+        </p:nvSpPr>
+        <p:spPr/>
+        <p:txBody>
+          <a:bodyPr/>
+          <a:lstStyle/>
+          <a:p>
+            <a:fld id="{BBFFFFB7-B427-4FC9-89B5-E815E530C709}" type="datetime1">
+              <a:rPr lang="de-DE" smtClean="0"/>
+              <a:t>21.05.2018</a:t>
+            </a:fld>
+            <a:endParaRPr lang="de-DE"/>
+          </a:p>
+        </p:txBody>
+      </p:sp>
+      <p:sp>
+        <p:nvSpPr>
+          <p:cNvPr id="5" name="Foliennummernplatzhalter 4">
+            <a:extLst>
+              <a:ext uri="{FF2B5EF4-FFF2-40B4-BE49-F238E27FC236}">
+                <a16:creationId xmlns:a16="http://schemas.microsoft.com/office/drawing/2014/main" id="{DD6B20C9-172C-4FD3-8A7B-669BF557EEA9}"/>
+              </a:ext>
+            </a:extLst>
+          </p:cNvPr>
+          <p:cNvSpPr>
+            <a:spLocks noGrp="1"/>
+          </p:cNvSpPr>
+          <p:nvPr>
+            <p:ph type="sldNum" sz="quarter" idx="12"/>
+          </p:nvPr>
+        </p:nvSpPr>
+        <p:spPr/>
+        <p:txBody>
+          <a:bodyPr/>
+          <a:lstStyle/>
+          <a:p>
+            <a:fld id="{C9BFD74B-BF5B-4F1B-BDFB-3F89FD2A71A6}" type="slidenum">
+              <a:rPr lang="de-DE" smtClean="0"/>
+              <a:t>11</a:t>
+            </a:fld>
+            <a:endParaRPr lang="de-DE"/>
+          </a:p>
+        </p:txBody>
+      </p:sp>
+      <p:pic>
+        <p:nvPicPr>
+          <p:cNvPr id="6" name="Grafik 5">
+            <a:extLst>
+              <a:ext uri="{FF2B5EF4-FFF2-40B4-BE49-F238E27FC236}">
+                <a16:creationId xmlns:a16="http://schemas.microsoft.com/office/drawing/2014/main" id="{28CC3CF0-A068-4E06-86F4-2E4387FD418B}"/>
+              </a:ext>
+            </a:extLst>
+          </p:cNvPr>
+          <p:cNvPicPr>
+            <a:picLocks noChangeAspect="1"/>
+          </p:cNvPicPr>
+          <p:nvPr/>
+        </p:nvPicPr>
+        <p:blipFill>
+          <a:blip r:embed="rId2"/>
+          <a:stretch>
+            <a:fillRect/>
+          </a:stretch>
+        </p:blipFill>
+        <p:spPr>
+          <a:xfrm>
+            <a:off x="1097280" y="3598385"/>
+            <a:ext cx="10115203" cy="2379083"/>
+          </a:xfrm>
+          <a:prstGeom prst="rect">
+            <a:avLst/>
+          </a:prstGeom>
+        </p:spPr>
+      </p:pic>
+      <p:pic>
+        <p:nvPicPr>
+          <p:cNvPr id="1026" name="Picture 2" descr="https://artillery.io/img/flag.png">
+            <a:extLst>
+              <a:ext uri="{FF2B5EF4-FFF2-40B4-BE49-F238E27FC236}">
+                <a16:creationId xmlns:a16="http://schemas.microsoft.com/office/drawing/2014/main" id="{7C37DBBC-6BFC-4ACA-9975-E6A1AD5F5A5B}"/>
+              </a:ext>
+            </a:extLst>
+          </p:cNvPr>
+          <p:cNvPicPr>
+            <a:picLocks noChangeAspect="1" noChangeArrowheads="1"/>
+          </p:cNvPicPr>
+          <p:nvPr/>
+        </p:nvPicPr>
+        <p:blipFill>
+          <a:blip r:embed="rId3">
+            <a:extLst>
+              <a:ext uri="{28A0092B-C50C-407E-A947-70E740481C1C}">
+                <a14:useLocalDpi xmlns:a14="http://schemas.microsoft.com/office/drawing/2010/main" val="0"/>
+              </a:ext>
+            </a:extLst>
+          </a:blip>
+          <a:srcRect/>
+          <a:stretch>
+            <a:fillRect/>
+          </a:stretch>
+        </p:blipFill>
+        <p:spPr bwMode="auto">
+          <a:xfrm>
+            <a:off x="9339151" y="1062683"/>
+            <a:ext cx="1816529" cy="601468"/>
+          </a:xfrm>
+          <a:prstGeom prst="rect">
+            <a:avLst/>
+          </a:prstGeom>
+          <a:noFill/>
+          <a:extLst>
+            <a:ext uri="{909E8E84-426E-40DD-AFC4-6F175D3DCCD1}">
+              <a14:hiddenFill xmlns:a14="http://schemas.microsoft.com/office/drawing/2010/main">
+                <a:solidFill>
+                  <a:srgbClr val="FFFFFF"/>
+                </a:solidFill>
+              </a14:hiddenFill>
+            </a:ext>
+          </a:extLst>
+        </p:spPr>
+      </p:pic>
+    </p:spTree>
+    <p:extLst>
+      <p:ext uri="{BB962C8B-B14F-4D97-AF65-F5344CB8AC3E}">
+        <p14:creationId xmlns:p14="http://schemas.microsoft.com/office/powerpoint/2010/main" val="2009351680"/>
+      </p:ext>
+    </p:extLst>
+  </p:cSld>
+  <p:clrMapOvr>
+    <a:masterClrMapping/>
+  </p:clrMapOvr>
+</p:sld>
+</file>
+
+<file path=ppt/slides/slide12.xml><?xml version="1.0" encoding="utf-8"?>
+<p:sld xmlns:a="http://schemas.openxmlformats.org/drawingml/2006/main" xmlns:r="http://schemas.openxmlformats.org/officeDocument/2006/relationships" xmlns:p="http://schemas.openxmlformats.org/presentationml/2006/main">
+  <p:cSld>
+    <p:spTree>
+      <p:nvGrpSpPr>
+        <p:cNvPr id="1" name=""/>
+        <p:cNvGrpSpPr/>
+        <p:nvPr/>
+      </p:nvGrpSpPr>
+      <p:grpSpPr>
+        <a:xfrm>
+          <a:off x="0" y="0"/>
+          <a:ext cx="0" cy="0"/>
+          <a:chOff x="0" y="0"/>
+          <a:chExt cx="0" cy="0"/>
+        </a:xfrm>
+      </p:grpSpPr>
+      <p:sp>
+        <p:nvSpPr>
+          <p:cNvPr id="2" name="Titel 1">
+            <a:extLst>
+              <a:ext uri="{FF2B5EF4-FFF2-40B4-BE49-F238E27FC236}">
+                <a16:creationId xmlns:a16="http://schemas.microsoft.com/office/drawing/2014/main" id="{FC5E778E-2A11-4C1E-8D8C-273067E4E86A}"/>
+              </a:ext>
+            </a:extLst>
+          </p:cNvPr>
+          <p:cNvSpPr>
+            <a:spLocks noGrp="1"/>
+          </p:cNvSpPr>
+          <p:nvPr>
+            <p:ph type="title"/>
+          </p:nvPr>
+        </p:nvSpPr>
+        <p:spPr/>
+        <p:txBody>
+          <a:bodyPr/>
+          <a:lstStyle/>
+          <a:p>
+            <a:r>
+              <a:rPr lang="de-DE" dirty="0"/>
+              <a:t>k6 </a:t>
+            </a:r>
+          </a:p>
+        </p:txBody>
+      </p:sp>
+      <p:sp>
+        <p:nvSpPr>
+          <p:cNvPr id="4" name="Datumsplatzhalter 3">
+            <a:extLst>
+              <a:ext uri="{FF2B5EF4-FFF2-40B4-BE49-F238E27FC236}">
+                <a16:creationId xmlns:a16="http://schemas.microsoft.com/office/drawing/2014/main" id="{DD0D5017-119E-4C58-9EF9-8EA436CBC7DC}"/>
+              </a:ext>
+            </a:extLst>
+          </p:cNvPr>
+          <p:cNvSpPr>
+            <a:spLocks noGrp="1"/>
+          </p:cNvSpPr>
+          <p:nvPr>
+            <p:ph type="dt" sz="half" idx="10"/>
+          </p:nvPr>
+        </p:nvSpPr>
+        <p:spPr/>
+        <p:txBody>
+          <a:bodyPr/>
+          <a:lstStyle/>
+          <a:p>
+            <a:fld id="{BBFFFFB7-B427-4FC9-89B5-E815E530C709}" type="datetime1">
+              <a:rPr lang="de-DE" smtClean="0"/>
+              <a:t>21.05.2018</a:t>
+            </a:fld>
+            <a:endParaRPr lang="de-DE"/>
+          </a:p>
+        </p:txBody>
+      </p:sp>
+      <p:sp>
+        <p:nvSpPr>
+          <p:cNvPr id="5" name="Foliennummernplatzhalter 4">
+            <a:extLst>
+              <a:ext uri="{FF2B5EF4-FFF2-40B4-BE49-F238E27FC236}">
+                <a16:creationId xmlns:a16="http://schemas.microsoft.com/office/drawing/2014/main" id="{942EAD44-7938-41E8-BB37-7A5A16FC2BD2}"/>
+              </a:ext>
+            </a:extLst>
+          </p:cNvPr>
+          <p:cNvSpPr>
+            <a:spLocks noGrp="1"/>
+          </p:cNvSpPr>
+          <p:nvPr>
+            <p:ph type="sldNum" sz="quarter" idx="12"/>
+          </p:nvPr>
+        </p:nvSpPr>
+        <p:spPr/>
+        <p:txBody>
+          <a:bodyPr/>
+          <a:lstStyle/>
+          <a:p>
+            <a:fld id="{C9BFD74B-BF5B-4F1B-BDFB-3F89FD2A71A6}" type="slidenum">
+              <a:rPr lang="de-DE" smtClean="0"/>
+              <a:t>12</a:t>
             </a:fld>
             <a:endParaRPr lang="de-DE"/>
           </a:p>
@@ -4476,7 +4927,7 @@
 </p:sld>
 </file>
 
-<file path=ppt/slides/slide11.xml><?xml version="1.0" encoding="utf-8"?>
+<file path=ppt/slides/slide13.xml><?xml version="1.0" encoding="utf-8"?>
 <p:sld xmlns:a="http://schemas.openxmlformats.org/drawingml/2006/main" xmlns:r="http://schemas.openxmlformats.org/officeDocument/2006/relationships" xmlns:p="http://schemas.openxmlformats.org/presentationml/2006/main">
   <p:cSld>
     <p:spTree>
@@ -4569,7 +5020,7 @@
           <a:p>
             <a:fld id="{BBFFFFB7-B427-4FC9-89B5-E815E530C709}" type="datetime1">
               <a:rPr lang="de-DE" smtClean="0"/>
-              <a:t>14.05.2018</a:t>
+              <a:t>21.05.2018</a:t>
             </a:fld>
             <a:endParaRPr lang="de-DE"/>
           </a:p>
@@ -4598,7 +5049,7 @@
           <a:p>
             <a:fld id="{C9BFD74B-BF5B-4F1B-BDFB-3F89FD2A71A6}" type="slidenum">
               <a:rPr lang="de-DE" smtClean="0"/>
-              <a:t>11</a:t>
+              <a:t>13</a:t>
             </a:fld>
             <a:endParaRPr lang="de-DE"/>
           </a:p>
@@ -4634,6 +5085,53 @@
           </a:prstGeom>
         </p:spPr>
       </p:pic>
+      <p:pic>
+        <p:nvPicPr>
+          <p:cNvPr id="2050" name="Picture 2" descr="Codename: Taurus">
+            <a:extLst>
+              <a:ext uri="{FF2B5EF4-FFF2-40B4-BE49-F238E27FC236}">
+                <a16:creationId xmlns:a16="http://schemas.microsoft.com/office/drawing/2014/main" id="{4C582773-7BB6-487A-B9DB-269F0D3F71AB}"/>
+              </a:ext>
+            </a:extLst>
+          </p:cNvPr>
+          <p:cNvPicPr>
+            <a:picLocks noChangeAspect="1" noChangeArrowheads="1"/>
+          </p:cNvPicPr>
+          <p:nvPr/>
+        </p:nvPicPr>
+        <p:blipFill>
+          <a:blip r:embed="rId3">
+            <a:extLst>
+              <a:ext uri="{28A0092B-C50C-407E-A947-70E740481C1C}">
+                <a14:useLocalDpi xmlns:a14="http://schemas.microsoft.com/office/drawing/2010/main" val="0"/>
+              </a:ext>
+            </a:extLst>
+          </a:blip>
+          <a:srcRect/>
+          <a:stretch>
+            <a:fillRect/>
+          </a:stretch>
+        </p:blipFill>
+        <p:spPr bwMode="auto">
+          <a:xfrm>
+            <a:off x="8822055" y="1119065"/>
+            <a:ext cx="2333625" cy="561975"/>
+          </a:xfrm>
+          <a:prstGeom prst="rect">
+            <a:avLst/>
+          </a:prstGeom>
+          <a:noFill/>
+          <a:extLst>
+            <a:ext uri="{909E8E84-426E-40DD-AFC4-6F175D3DCCD1}">
+              <a14:hiddenFill xmlns:a14="http://schemas.microsoft.com/office/drawing/2010/main">
+                <a:solidFill>
+                  <a:srgbClr val="FFFFFF"/>
+                </a:solidFill>
+              </a14:hiddenFill>
+            </a:ext>
+          </a:extLst>
+        </p:spPr>
+      </p:pic>
     </p:spTree>
     <p:extLst>
       <p:ext uri="{BB962C8B-B14F-4D97-AF65-F5344CB8AC3E}">
@@ -4647,7 +5145,7 @@
 </p:sld>
 </file>
 
-<file path=ppt/slides/slide12.xml><?xml version="1.0" encoding="utf-8"?>
+<file path=ppt/slides/slide14.xml><?xml version="1.0" encoding="utf-8"?>
 <p:sld xmlns:a="http://schemas.openxmlformats.org/drawingml/2006/main" xmlns:r="http://schemas.openxmlformats.org/officeDocument/2006/relationships" xmlns:p="http://schemas.openxmlformats.org/presentationml/2006/main">
   <p:cSld>
     <p:spTree>
@@ -4740,7 +5238,7 @@
           <a:p>
             <a:fld id="{BBFFFFB7-B427-4FC9-89B5-E815E530C709}" type="datetime1">
               <a:rPr lang="de-DE" smtClean="0"/>
-              <a:t>14.05.2018</a:t>
+              <a:t>21.05.2018</a:t>
             </a:fld>
             <a:endParaRPr lang="de-DE"/>
           </a:p>
@@ -4769,7 +5267,7 @@
           <a:p>
             <a:fld id="{C9BFD74B-BF5B-4F1B-BDFB-3F89FD2A71A6}" type="slidenum">
               <a:rPr lang="de-DE" smtClean="0"/>
-              <a:t>12</a:t>
+              <a:t>14</a:t>
             </a:fld>
             <a:endParaRPr lang="de-DE"/>
           </a:p>
@@ -4837,2540 +5335,6 @@
 </p:sld>
 </file>
 
-<file path=ppt/slides/slide13.xml><?xml version="1.0" encoding="utf-8"?>
-<p:sld xmlns:a="http://schemas.openxmlformats.org/drawingml/2006/main" xmlns:r="http://schemas.openxmlformats.org/officeDocument/2006/relationships" xmlns:p="http://schemas.openxmlformats.org/presentationml/2006/main">
-  <p:cSld>
-    <p:spTree>
-      <p:nvGrpSpPr>
-        <p:cNvPr id="1" name=""/>
-        <p:cNvGrpSpPr/>
-        <p:nvPr/>
-      </p:nvGrpSpPr>
-      <p:grpSpPr>
-        <a:xfrm>
-          <a:off x="0" y="0"/>
-          <a:ext cx="0" cy="0"/>
-          <a:chOff x="0" y="0"/>
-          <a:chExt cx="0" cy="0"/>
-        </a:xfrm>
-      </p:grpSpPr>
-      <p:sp>
-        <p:nvSpPr>
-          <p:cNvPr id="7" name="Titel 6"/>
-          <p:cNvSpPr>
-            <a:spLocks noGrp="1"/>
-          </p:cNvSpPr>
-          <p:nvPr>
-            <p:ph type="title"/>
-          </p:nvPr>
-        </p:nvSpPr>
-        <p:spPr/>
-        <p:txBody>
-          <a:bodyPr/>
-          <a:lstStyle/>
-          <a:p>
-            <a:r>
-              <a:rPr lang="de-DE" dirty="0"/>
-              <a:t>OSS Quick-Check</a:t>
-            </a:r>
-          </a:p>
-        </p:txBody>
-      </p:sp>
-      <p:graphicFrame>
-        <p:nvGraphicFramePr>
-          <p:cNvPr id="2" name="Inhaltsplatzhalter 1">
-            <a:extLst>
-              <a:ext uri="{FF2B5EF4-FFF2-40B4-BE49-F238E27FC236}">
-                <a16:creationId xmlns:a16="http://schemas.microsoft.com/office/drawing/2014/main" id="{E5799C5E-E5D0-4473-96FE-574B7EFC5A44}"/>
-              </a:ext>
-            </a:extLst>
-          </p:cNvPr>
-          <p:cNvGraphicFramePr>
-            <a:graphicFrameLocks noGrp="1"/>
-          </p:cNvGraphicFramePr>
-          <p:nvPr>
-            <p:ph idx="1"/>
-            <p:extLst>
-              <p:ext uri="{D42A27DB-BD31-4B8C-83A1-F6EECF244321}">
-                <p14:modId xmlns:p14="http://schemas.microsoft.com/office/powerpoint/2010/main" val="2210680487"/>
-              </p:ext>
-            </p:extLst>
-          </p:nvPr>
-        </p:nvGraphicFramePr>
-        <p:xfrm>
-          <a:off x="437326" y="1836408"/>
-          <a:ext cx="11273724" cy="3606800"/>
-        </p:xfrm>
-        <a:graphic>
-          <a:graphicData uri="http://schemas.openxmlformats.org/drawingml/2006/table">
-            <a:tbl>
-              <a:tblPr firstRow="1" bandRow="1">
-                <a:tableStyleId>{5C22544A-7EE6-4342-B048-85BDC9FD1C3A}</a:tableStyleId>
-              </a:tblPr>
-              <a:tblGrid>
-                <a:gridCol w="1684274">
-                  <a:extLst>
-                    <a:ext uri="{9D8B030D-6E8A-4147-A177-3AD203B41FA5}">
-                      <a16:colId xmlns:a16="http://schemas.microsoft.com/office/drawing/2014/main" val="2740601797"/>
-                    </a:ext>
-                  </a:extLst>
-                </a:gridCol>
-                <a:gridCol w="2110990">
-                  <a:extLst>
-                    <a:ext uri="{9D8B030D-6E8A-4147-A177-3AD203B41FA5}">
-                      <a16:colId xmlns:a16="http://schemas.microsoft.com/office/drawing/2014/main" val="130159350"/>
-                    </a:ext>
-                  </a:extLst>
-                </a:gridCol>
-                <a:gridCol w="1270318">
-                  <a:extLst>
-                    <a:ext uri="{9D8B030D-6E8A-4147-A177-3AD203B41FA5}">
-                      <a16:colId xmlns:a16="http://schemas.microsoft.com/office/drawing/2014/main" val="851099838"/>
-                    </a:ext>
-                  </a:extLst>
-                </a:gridCol>
-                <a:gridCol w="1374902">
-                  <a:extLst>
-                    <a:ext uri="{9D8B030D-6E8A-4147-A177-3AD203B41FA5}">
-                      <a16:colId xmlns:a16="http://schemas.microsoft.com/office/drawing/2014/main" val="2919539333"/>
-                    </a:ext>
-                  </a:extLst>
-                </a:gridCol>
-                <a:gridCol w="1229451">
-                  <a:extLst>
-                    <a:ext uri="{9D8B030D-6E8A-4147-A177-3AD203B41FA5}">
-                      <a16:colId xmlns:a16="http://schemas.microsoft.com/office/drawing/2014/main" val="3251378671"/>
-                    </a:ext>
-                  </a:extLst>
-                </a:gridCol>
-                <a:gridCol w="958569">
-                  <a:extLst>
-                    <a:ext uri="{9D8B030D-6E8A-4147-A177-3AD203B41FA5}">
-                      <a16:colId xmlns:a16="http://schemas.microsoft.com/office/drawing/2014/main" val="1017323343"/>
-                    </a:ext>
-                  </a:extLst>
-                </a:gridCol>
-                <a:gridCol w="1270318">
-                  <a:extLst>
-                    <a:ext uri="{9D8B030D-6E8A-4147-A177-3AD203B41FA5}">
-                      <a16:colId xmlns:a16="http://schemas.microsoft.com/office/drawing/2014/main" val="754126515"/>
-                    </a:ext>
-                  </a:extLst>
-                </a:gridCol>
-                <a:gridCol w="1374902">
-                  <a:extLst>
-                    <a:ext uri="{9D8B030D-6E8A-4147-A177-3AD203B41FA5}">
-                      <a16:colId xmlns:a16="http://schemas.microsoft.com/office/drawing/2014/main" val="507640895"/>
-                    </a:ext>
-                  </a:extLst>
-                </a:gridCol>
-              </a:tblGrid>
-              <a:tr h="370840">
-                <a:tc>
-                  <a:txBody>
-                    <a:bodyPr/>
-                    <a:lstStyle/>
-                    <a:p>
-                      <a:r>
-                        <a:rPr lang="de-DE" dirty="0"/>
-                        <a:t>Thema</a:t>
-                      </a:r>
-                    </a:p>
-                  </a:txBody>
-                  <a:tcPr/>
-                </a:tc>
-                <a:tc>
-                  <a:txBody>
-                    <a:bodyPr/>
-                    <a:lstStyle/>
-                    <a:p>
-                      <a:r>
-                        <a:rPr lang="de-DE" dirty="0"/>
-                        <a:t>Kriterium</a:t>
-                      </a:r>
-                    </a:p>
-                  </a:txBody>
-                  <a:tcPr/>
-                </a:tc>
-                <a:tc>
-                  <a:txBody>
-                    <a:bodyPr/>
-                    <a:lstStyle/>
-                    <a:p>
-                      <a:r>
-                        <a:rPr lang="de-DE" dirty="0"/>
-                        <a:t>Gatling</a:t>
-                      </a:r>
-                    </a:p>
-                  </a:txBody>
-                  <a:tcPr/>
-                </a:tc>
-                <a:tc>
-                  <a:txBody>
-                    <a:bodyPr/>
-                    <a:lstStyle/>
-                    <a:p>
-                      <a:r>
-                        <a:rPr lang="de-DE" dirty="0" err="1"/>
-                        <a:t>Locust</a:t>
-                      </a:r>
-                      <a:endParaRPr lang="de-DE" dirty="0"/>
-                    </a:p>
-                  </a:txBody>
-                  <a:tcPr/>
-                </a:tc>
-                <a:tc>
-                  <a:txBody>
-                    <a:bodyPr/>
-                    <a:lstStyle/>
-                    <a:p>
-                      <a:r>
-                        <a:rPr lang="de-DE" dirty="0"/>
-                        <a:t>Apache AB</a:t>
-                      </a:r>
-                    </a:p>
-                  </a:txBody>
-                  <a:tcPr/>
-                </a:tc>
-                <a:tc>
-                  <a:txBody>
-                    <a:bodyPr/>
-                    <a:lstStyle/>
-                    <a:p>
-                      <a:r>
-                        <a:rPr lang="de-DE" dirty="0"/>
-                        <a:t>k6</a:t>
-                      </a:r>
-                    </a:p>
-                  </a:txBody>
-                  <a:tcPr/>
-                </a:tc>
-                <a:tc>
-                  <a:txBody>
-                    <a:bodyPr/>
-                    <a:lstStyle/>
-                    <a:p>
-                      <a:r>
-                        <a:rPr lang="de-DE" dirty="0" err="1"/>
-                        <a:t>nGrinder</a:t>
-                      </a:r>
-                      <a:endParaRPr lang="de-DE" dirty="0"/>
-                    </a:p>
-                  </a:txBody>
-                  <a:tcPr/>
-                </a:tc>
-                <a:tc>
-                  <a:txBody>
-                    <a:bodyPr/>
-                    <a:lstStyle/>
-                    <a:p>
-                      <a:r>
-                        <a:rPr lang="de-DE" dirty="0"/>
-                        <a:t>Taurus</a:t>
-                      </a:r>
-                    </a:p>
-                  </a:txBody>
-                  <a:tcPr/>
-                </a:tc>
-                <a:extLst>
-                  <a:ext uri="{0D108BD9-81ED-4DB2-BD59-A6C34878D82A}">
-                    <a16:rowId xmlns:a16="http://schemas.microsoft.com/office/drawing/2014/main" val="1540211511"/>
-                  </a:ext>
-                </a:extLst>
-              </a:tr>
-              <a:tr h="370840">
-                <a:tc>
-                  <a:txBody>
-                    <a:bodyPr/>
-                    <a:lstStyle/>
-                    <a:p>
-                      <a:r>
-                        <a:rPr lang="de-DE" dirty="0"/>
-                        <a:t>Lizenz</a:t>
-                      </a:r>
-                    </a:p>
-                  </a:txBody>
-                  <a:tcPr/>
-                </a:tc>
-                <a:tc>
-                  <a:txBody>
-                    <a:bodyPr/>
-                    <a:lstStyle/>
-                    <a:p>
-                      <a:r>
-                        <a:rPr lang="de-DE" dirty="0"/>
-                        <a:t>Lizenz</a:t>
-                      </a:r>
-                    </a:p>
-                  </a:txBody>
-                  <a:tcPr/>
-                </a:tc>
-                <a:tc>
-                  <a:txBody>
-                    <a:bodyPr/>
-                    <a:lstStyle/>
-                    <a:p>
-                      <a:r>
-                        <a:rPr lang="de-DE" dirty="0"/>
-                        <a:t>Apache 2.0</a:t>
-                      </a:r>
-                    </a:p>
-                  </a:txBody>
-                  <a:tcPr>
-                    <a:solidFill>
-                      <a:srgbClr val="92D050"/>
-                    </a:solidFill>
-                  </a:tcPr>
-                </a:tc>
-                <a:tc>
-                  <a:txBody>
-                    <a:bodyPr/>
-                    <a:lstStyle/>
-                    <a:p>
-                      <a:r>
-                        <a:rPr lang="de-DE" dirty="0"/>
-                        <a:t>MIT</a:t>
-                      </a:r>
-                    </a:p>
-                  </a:txBody>
-                  <a:tcPr>
-                    <a:solidFill>
-                      <a:srgbClr val="92D050"/>
-                    </a:solidFill>
-                  </a:tcPr>
-                </a:tc>
-                <a:tc>
-                  <a:txBody>
-                    <a:bodyPr/>
-                    <a:lstStyle/>
-                    <a:p>
-                      <a:r>
-                        <a:rPr lang="de-DE" dirty="0"/>
-                        <a:t>Apache </a:t>
-                      </a:r>
-                    </a:p>
-                  </a:txBody>
-                  <a:tcPr>
-                    <a:solidFill>
-                      <a:srgbClr val="92D050"/>
-                    </a:solidFill>
-                  </a:tcPr>
-                </a:tc>
-                <a:tc>
-                  <a:txBody>
-                    <a:bodyPr/>
-                    <a:lstStyle/>
-                    <a:p>
-                      <a:r>
-                        <a:rPr lang="de-DE" dirty="0"/>
-                        <a:t>AGPL</a:t>
-                      </a:r>
-                    </a:p>
-                  </a:txBody>
-                  <a:tcPr>
-                    <a:solidFill>
-                      <a:srgbClr val="FF0000"/>
-                    </a:solidFill>
-                  </a:tcPr>
-                </a:tc>
-                <a:tc>
-                  <a:txBody>
-                    <a:bodyPr/>
-                    <a:lstStyle/>
-                    <a:p>
-                      <a:r>
-                        <a:rPr lang="de-DE" dirty="0"/>
-                        <a:t>Apache 2.0</a:t>
-                      </a:r>
-                    </a:p>
-                  </a:txBody>
-                  <a:tcPr>
-                    <a:solidFill>
-                      <a:srgbClr val="92D050"/>
-                    </a:solidFill>
-                  </a:tcPr>
-                </a:tc>
-                <a:tc>
-                  <a:txBody>
-                    <a:bodyPr/>
-                    <a:lstStyle/>
-                    <a:p>
-                      <a:r>
-                        <a:rPr lang="de-DE" dirty="0"/>
-                        <a:t>Apache 2.0</a:t>
-                      </a:r>
-                    </a:p>
-                  </a:txBody>
-                  <a:tcPr>
-                    <a:solidFill>
-                      <a:srgbClr val="92D050"/>
-                    </a:solidFill>
-                  </a:tcPr>
-                </a:tc>
-                <a:extLst>
-                  <a:ext uri="{0D108BD9-81ED-4DB2-BD59-A6C34878D82A}">
-                    <a16:rowId xmlns:a16="http://schemas.microsoft.com/office/drawing/2014/main" val="2067020263"/>
-                  </a:ext>
-                </a:extLst>
-              </a:tr>
-              <a:tr h="370840">
-                <a:tc rowSpan="2">
-                  <a:txBody>
-                    <a:bodyPr/>
-                    <a:lstStyle/>
-                    <a:p>
-                      <a:r>
-                        <a:rPr lang="de-DE" dirty="0"/>
-                        <a:t>Reifegrad</a:t>
-                      </a:r>
-                    </a:p>
-                  </a:txBody>
-                  <a:tcPr anchor="ctr"/>
-                </a:tc>
-                <a:tc>
-                  <a:txBody>
-                    <a:bodyPr/>
-                    <a:lstStyle/>
-                    <a:p>
-                      <a:r>
-                        <a:rPr lang="de-DE" dirty="0"/>
-                        <a:t>Stable Release &gt; 1.0</a:t>
-                      </a:r>
-                    </a:p>
-                  </a:txBody>
-                  <a:tcPr/>
-                </a:tc>
-                <a:tc>
-                  <a:txBody>
-                    <a:bodyPr/>
-                    <a:lstStyle/>
-                    <a:p>
-                      <a:r>
-                        <a:rPr lang="de-DE" dirty="0"/>
-                        <a:t>2.3.1</a:t>
-                      </a:r>
-                    </a:p>
-                  </a:txBody>
-                  <a:tcPr>
-                    <a:solidFill>
-                      <a:srgbClr val="92D050"/>
-                    </a:solidFill>
-                  </a:tcPr>
-                </a:tc>
-                <a:tc>
-                  <a:txBody>
-                    <a:bodyPr/>
-                    <a:lstStyle/>
-                    <a:p>
-                      <a:r>
-                        <a:rPr lang="de-DE" dirty="0"/>
-                        <a:t>0.8.1</a:t>
-                      </a:r>
-                    </a:p>
-                  </a:txBody>
-                  <a:tcPr>
-                    <a:solidFill>
-                      <a:srgbClr val="FF0000"/>
-                    </a:solidFill>
-                  </a:tcPr>
-                </a:tc>
-                <a:tc>
-                  <a:txBody>
-                    <a:bodyPr/>
-                    <a:lstStyle/>
-                    <a:p>
-                      <a:endParaRPr lang="de-DE" dirty="0"/>
-                    </a:p>
-                  </a:txBody>
-                  <a:tcPr/>
-                </a:tc>
-                <a:tc>
-                  <a:txBody>
-                    <a:bodyPr/>
-                    <a:lstStyle/>
-                    <a:p>
-                      <a:r>
-                        <a:rPr lang="de-DE" dirty="0"/>
-                        <a:t>0.20.0</a:t>
-                      </a:r>
-                    </a:p>
-                  </a:txBody>
-                  <a:tcPr>
-                    <a:solidFill>
-                      <a:srgbClr val="FF0000"/>
-                    </a:solidFill>
-                  </a:tcPr>
-                </a:tc>
-                <a:tc>
-                  <a:txBody>
-                    <a:bodyPr/>
-                    <a:lstStyle/>
-                    <a:p>
-                      <a:r>
-                        <a:rPr lang="de-DE" dirty="0"/>
-                        <a:t>3.4.1</a:t>
-                      </a:r>
-                    </a:p>
-                  </a:txBody>
-                  <a:tcPr>
-                    <a:solidFill>
-                      <a:srgbClr val="92D050"/>
-                    </a:solidFill>
-                  </a:tcPr>
-                </a:tc>
-                <a:tc>
-                  <a:txBody>
-                    <a:bodyPr/>
-                    <a:lstStyle/>
-                    <a:p>
-                      <a:r>
-                        <a:rPr lang="de-DE" dirty="0"/>
-                        <a:t>1.11.0</a:t>
-                      </a:r>
-                    </a:p>
-                  </a:txBody>
-                  <a:tcPr>
-                    <a:solidFill>
-                      <a:srgbClr val="92D050"/>
-                    </a:solidFill>
-                  </a:tcPr>
-                </a:tc>
-                <a:extLst>
-                  <a:ext uri="{0D108BD9-81ED-4DB2-BD59-A6C34878D82A}">
-                    <a16:rowId xmlns:a16="http://schemas.microsoft.com/office/drawing/2014/main" val="1717473814"/>
-                  </a:ext>
-                </a:extLst>
-              </a:tr>
-              <a:tr h="370840">
-                <a:tc vMerge="1">
-                  <a:txBody>
-                    <a:bodyPr/>
-                    <a:lstStyle/>
-                    <a:p>
-                      <a:endParaRPr lang="de-DE" dirty="0"/>
-                    </a:p>
-                  </a:txBody>
-                  <a:tcPr/>
-                </a:tc>
-                <a:tc>
-                  <a:txBody>
-                    <a:bodyPr/>
-                    <a:lstStyle/>
-                    <a:p>
-                      <a:r>
-                        <a:rPr lang="de-DE" dirty="0"/>
-                        <a:t>Existiert &gt; 1 Jahr</a:t>
-                      </a:r>
-                    </a:p>
-                  </a:txBody>
-                  <a:tcPr/>
-                </a:tc>
-                <a:tc>
-                  <a:txBody>
-                    <a:bodyPr/>
-                    <a:lstStyle/>
-                    <a:p>
-                      <a:r>
-                        <a:rPr lang="de-DE" dirty="0"/>
-                        <a:t>2012</a:t>
-                      </a:r>
-                    </a:p>
-                  </a:txBody>
-                  <a:tcPr>
-                    <a:solidFill>
-                      <a:srgbClr val="92D050"/>
-                    </a:solidFill>
-                  </a:tcPr>
-                </a:tc>
-                <a:tc>
-                  <a:txBody>
-                    <a:bodyPr/>
-                    <a:lstStyle/>
-                    <a:p>
-                      <a:r>
-                        <a:rPr lang="de-DE" dirty="0"/>
-                        <a:t>2011</a:t>
-                      </a:r>
-                    </a:p>
-                  </a:txBody>
-                  <a:tcPr>
-                    <a:solidFill>
-                      <a:srgbClr val="92D050"/>
-                    </a:solidFill>
-                  </a:tcPr>
-                </a:tc>
-                <a:tc>
-                  <a:txBody>
-                    <a:bodyPr/>
-                    <a:lstStyle/>
-                    <a:p>
-                      <a:endParaRPr lang="de-DE" dirty="0"/>
-                    </a:p>
-                  </a:txBody>
-                  <a:tcPr/>
-                </a:tc>
-                <a:tc>
-                  <a:txBody>
-                    <a:bodyPr/>
-                    <a:lstStyle/>
-                    <a:p>
-                      <a:r>
-                        <a:rPr lang="de-DE" dirty="0"/>
-                        <a:t>2017</a:t>
-                      </a:r>
-                    </a:p>
-                  </a:txBody>
-                  <a:tcPr>
-                    <a:solidFill>
-                      <a:srgbClr val="92D050"/>
-                    </a:solidFill>
-                  </a:tcPr>
-                </a:tc>
-                <a:tc>
-                  <a:txBody>
-                    <a:bodyPr/>
-                    <a:lstStyle/>
-                    <a:p>
-                      <a:r>
-                        <a:rPr lang="de-DE" dirty="0"/>
-                        <a:t>2012</a:t>
-                      </a:r>
-                    </a:p>
-                  </a:txBody>
-                  <a:tcPr>
-                    <a:solidFill>
-                      <a:srgbClr val="92D050"/>
-                    </a:solidFill>
-                  </a:tcPr>
-                </a:tc>
-                <a:tc>
-                  <a:txBody>
-                    <a:bodyPr/>
-                    <a:lstStyle/>
-                    <a:p>
-                      <a:r>
-                        <a:rPr lang="de-DE" dirty="0"/>
-                        <a:t>2016</a:t>
-                      </a:r>
-                    </a:p>
-                  </a:txBody>
-                  <a:tcPr>
-                    <a:solidFill>
-                      <a:srgbClr val="92D050"/>
-                    </a:solidFill>
-                  </a:tcPr>
-                </a:tc>
-                <a:extLst>
-                  <a:ext uri="{0D108BD9-81ED-4DB2-BD59-A6C34878D82A}">
-                    <a16:rowId xmlns:a16="http://schemas.microsoft.com/office/drawing/2014/main" val="3172502802"/>
-                  </a:ext>
-                </a:extLst>
-              </a:tr>
-              <a:tr h="370840">
-                <a:tc rowSpan="2">
-                  <a:txBody>
-                    <a:bodyPr/>
-                    <a:lstStyle/>
-                    <a:p>
-                      <a:pPr algn="l"/>
-                      <a:r>
-                        <a:rPr lang="de-DE" dirty="0"/>
-                        <a:t>Support</a:t>
-                      </a:r>
-                    </a:p>
-                  </a:txBody>
-                  <a:tcPr anchor="ctr"/>
-                </a:tc>
-                <a:tc>
-                  <a:txBody>
-                    <a:bodyPr/>
-                    <a:lstStyle/>
-                    <a:p>
-                      <a:r>
-                        <a:rPr lang="de-DE" dirty="0" err="1"/>
-                        <a:t>Issue</a:t>
-                      </a:r>
-                      <a:r>
-                        <a:rPr lang="de-DE" dirty="0"/>
-                        <a:t> Tracker</a:t>
-                      </a:r>
-                    </a:p>
-                  </a:txBody>
-                  <a:tcPr/>
-                </a:tc>
-                <a:tc>
-                  <a:txBody>
-                    <a:bodyPr/>
-                    <a:lstStyle/>
-                    <a:p>
-                      <a:r>
-                        <a:rPr lang="de-DE" dirty="0"/>
-                        <a:t>GitHub</a:t>
-                      </a:r>
-                    </a:p>
-                  </a:txBody>
-                  <a:tcPr>
-                    <a:solidFill>
-                      <a:srgbClr val="92D050"/>
-                    </a:solidFill>
-                  </a:tcPr>
-                </a:tc>
-                <a:tc>
-                  <a:txBody>
-                    <a:bodyPr/>
-                    <a:lstStyle/>
-                    <a:p>
-                      <a:r>
-                        <a:rPr lang="de-DE" dirty="0"/>
-                        <a:t>GitHub</a:t>
-                      </a:r>
-                    </a:p>
-                  </a:txBody>
-                  <a:tcPr>
-                    <a:solidFill>
-                      <a:srgbClr val="92D050"/>
-                    </a:solidFill>
-                  </a:tcPr>
-                </a:tc>
-                <a:tc>
-                  <a:txBody>
-                    <a:bodyPr/>
-                    <a:lstStyle/>
-                    <a:p>
-                      <a:endParaRPr lang="de-DE" dirty="0"/>
-                    </a:p>
-                  </a:txBody>
-                  <a:tcPr/>
-                </a:tc>
-                <a:tc>
-                  <a:txBody>
-                    <a:bodyPr/>
-                    <a:lstStyle/>
-                    <a:p>
-                      <a:r>
-                        <a:rPr lang="de-DE" dirty="0"/>
-                        <a:t>GitHub</a:t>
-                      </a:r>
-                    </a:p>
-                  </a:txBody>
-                  <a:tcPr>
-                    <a:solidFill>
-                      <a:srgbClr val="92D050"/>
-                    </a:solidFill>
-                  </a:tcPr>
-                </a:tc>
-                <a:tc>
-                  <a:txBody>
-                    <a:bodyPr/>
-                    <a:lstStyle/>
-                    <a:p>
-                      <a:r>
-                        <a:rPr lang="de-DE" dirty="0"/>
-                        <a:t>GitHub</a:t>
-                      </a:r>
-                    </a:p>
-                  </a:txBody>
-                  <a:tcPr>
-                    <a:solidFill>
-                      <a:srgbClr val="92D050"/>
-                    </a:solidFill>
-                  </a:tcPr>
-                </a:tc>
-                <a:tc>
-                  <a:txBody>
-                    <a:bodyPr/>
-                    <a:lstStyle/>
-                    <a:p>
-                      <a:r>
-                        <a:rPr lang="de-DE" dirty="0"/>
-                        <a:t>Google Groups</a:t>
-                      </a:r>
-                    </a:p>
-                  </a:txBody>
-                  <a:tcPr>
-                    <a:solidFill>
-                      <a:srgbClr val="92D050"/>
-                    </a:solidFill>
-                  </a:tcPr>
-                </a:tc>
-                <a:extLst>
-                  <a:ext uri="{0D108BD9-81ED-4DB2-BD59-A6C34878D82A}">
-                    <a16:rowId xmlns:a16="http://schemas.microsoft.com/office/drawing/2014/main" val="4285906766"/>
-                  </a:ext>
-                </a:extLst>
-              </a:tr>
-              <a:tr h="370840">
-                <a:tc vMerge="1">
-                  <a:txBody>
-                    <a:bodyPr/>
-                    <a:lstStyle/>
-                    <a:p>
-                      <a:endParaRPr lang="de-DE" dirty="0"/>
-                    </a:p>
-                  </a:txBody>
-                  <a:tcPr/>
-                </a:tc>
-                <a:tc>
-                  <a:txBody>
-                    <a:bodyPr/>
-                    <a:lstStyle/>
-                    <a:p>
-                      <a:r>
-                        <a:rPr lang="de-DE" dirty="0"/>
-                        <a:t>Antwortzeit &lt; 24h</a:t>
-                      </a:r>
-                    </a:p>
-                  </a:txBody>
-                  <a:tcPr/>
-                </a:tc>
-                <a:tc>
-                  <a:txBody>
-                    <a:bodyPr/>
-                    <a:lstStyle/>
-                    <a:p>
-                      <a:endParaRPr lang="de-DE" dirty="0"/>
-                    </a:p>
-                  </a:txBody>
-                  <a:tcPr/>
-                </a:tc>
-                <a:tc>
-                  <a:txBody>
-                    <a:bodyPr/>
-                    <a:lstStyle/>
-                    <a:p>
-                      <a:endParaRPr lang="de-DE"/>
-                    </a:p>
-                  </a:txBody>
-                  <a:tcPr/>
-                </a:tc>
-                <a:tc>
-                  <a:txBody>
-                    <a:bodyPr/>
-                    <a:lstStyle/>
-                    <a:p>
-                      <a:endParaRPr lang="de-DE"/>
-                    </a:p>
-                  </a:txBody>
-                  <a:tcPr/>
-                </a:tc>
-                <a:tc>
-                  <a:txBody>
-                    <a:bodyPr/>
-                    <a:lstStyle/>
-                    <a:p>
-                      <a:endParaRPr lang="de-DE"/>
-                    </a:p>
-                  </a:txBody>
-                  <a:tcPr/>
-                </a:tc>
-                <a:tc>
-                  <a:txBody>
-                    <a:bodyPr/>
-                    <a:lstStyle/>
-                    <a:p>
-                      <a:endParaRPr lang="de-DE"/>
-                    </a:p>
-                  </a:txBody>
-                  <a:tcPr/>
-                </a:tc>
-                <a:tc>
-                  <a:txBody>
-                    <a:bodyPr/>
-                    <a:lstStyle/>
-                    <a:p>
-                      <a:endParaRPr lang="de-DE"/>
-                    </a:p>
-                  </a:txBody>
-                  <a:tcPr/>
-                </a:tc>
-                <a:extLst>
-                  <a:ext uri="{0D108BD9-81ED-4DB2-BD59-A6C34878D82A}">
-                    <a16:rowId xmlns:a16="http://schemas.microsoft.com/office/drawing/2014/main" val="468078094"/>
-                  </a:ext>
-                </a:extLst>
-              </a:tr>
-              <a:tr h="370840">
-                <a:tc rowSpan="3">
-                  <a:txBody>
-                    <a:bodyPr/>
-                    <a:lstStyle/>
-                    <a:p>
-                      <a:r>
-                        <a:rPr lang="de-DE" dirty="0"/>
-                        <a:t>Dokumentation</a:t>
-                      </a:r>
-                    </a:p>
-                  </a:txBody>
-                  <a:tcPr anchor="ctr"/>
-                </a:tc>
-                <a:tc>
-                  <a:txBody>
-                    <a:bodyPr/>
-                    <a:lstStyle/>
-                    <a:p>
-                      <a:r>
-                        <a:rPr lang="de-DE" dirty="0"/>
-                        <a:t>API Dokumentation</a:t>
-                      </a:r>
-                    </a:p>
-                  </a:txBody>
-                  <a:tcPr/>
-                </a:tc>
-                <a:tc>
-                  <a:txBody>
-                    <a:bodyPr/>
-                    <a:lstStyle/>
-                    <a:p>
-                      <a:endParaRPr lang="de-DE" dirty="0"/>
-                    </a:p>
-                  </a:txBody>
-                  <a:tcPr/>
-                </a:tc>
-                <a:tc>
-                  <a:txBody>
-                    <a:bodyPr/>
-                    <a:lstStyle/>
-                    <a:p>
-                      <a:endParaRPr lang="de-DE" dirty="0"/>
-                    </a:p>
-                  </a:txBody>
-                  <a:tcPr/>
-                </a:tc>
-                <a:tc>
-                  <a:txBody>
-                    <a:bodyPr/>
-                    <a:lstStyle/>
-                    <a:p>
-                      <a:endParaRPr lang="de-DE" dirty="0"/>
-                    </a:p>
-                  </a:txBody>
-                  <a:tcPr/>
-                </a:tc>
-                <a:tc>
-                  <a:txBody>
-                    <a:bodyPr/>
-                    <a:lstStyle/>
-                    <a:p>
-                      <a:endParaRPr lang="de-DE" dirty="0"/>
-                    </a:p>
-                  </a:txBody>
-                  <a:tcPr/>
-                </a:tc>
-                <a:tc>
-                  <a:txBody>
-                    <a:bodyPr/>
-                    <a:lstStyle/>
-                    <a:p>
-                      <a:endParaRPr lang="de-DE" dirty="0"/>
-                    </a:p>
-                  </a:txBody>
-                  <a:tcPr/>
-                </a:tc>
-                <a:tc>
-                  <a:txBody>
-                    <a:bodyPr/>
-                    <a:lstStyle/>
-                    <a:p>
-                      <a:endParaRPr lang="de-DE" dirty="0"/>
-                    </a:p>
-                  </a:txBody>
-                  <a:tcPr/>
-                </a:tc>
-                <a:extLst>
-                  <a:ext uri="{0D108BD9-81ED-4DB2-BD59-A6C34878D82A}">
-                    <a16:rowId xmlns:a16="http://schemas.microsoft.com/office/drawing/2014/main" val="3465109363"/>
-                  </a:ext>
-                </a:extLst>
-              </a:tr>
-              <a:tr h="370840">
-                <a:tc vMerge="1">
-                  <a:txBody>
-                    <a:bodyPr/>
-                    <a:lstStyle/>
-                    <a:p>
-                      <a:endParaRPr lang="de-DE" dirty="0"/>
-                    </a:p>
-                  </a:txBody>
-                  <a:tcPr/>
-                </a:tc>
-                <a:tc>
-                  <a:txBody>
-                    <a:bodyPr/>
-                    <a:lstStyle/>
-                    <a:p>
-                      <a:r>
-                        <a:rPr lang="de-DE" dirty="0"/>
-                        <a:t>Tutorials</a:t>
-                      </a:r>
-                    </a:p>
-                  </a:txBody>
-                  <a:tcPr/>
-                </a:tc>
-                <a:tc>
-                  <a:txBody>
-                    <a:bodyPr/>
-                    <a:lstStyle/>
-                    <a:p>
-                      <a:endParaRPr lang="de-DE" dirty="0"/>
-                    </a:p>
-                  </a:txBody>
-                  <a:tcPr/>
-                </a:tc>
-                <a:tc>
-                  <a:txBody>
-                    <a:bodyPr/>
-                    <a:lstStyle/>
-                    <a:p>
-                      <a:endParaRPr lang="de-DE" dirty="0"/>
-                    </a:p>
-                  </a:txBody>
-                  <a:tcPr/>
-                </a:tc>
-                <a:tc>
-                  <a:txBody>
-                    <a:bodyPr/>
-                    <a:lstStyle/>
-                    <a:p>
-                      <a:endParaRPr lang="de-DE" dirty="0"/>
-                    </a:p>
-                  </a:txBody>
-                  <a:tcPr/>
-                </a:tc>
-                <a:tc>
-                  <a:txBody>
-                    <a:bodyPr/>
-                    <a:lstStyle/>
-                    <a:p>
-                      <a:endParaRPr lang="de-DE" dirty="0"/>
-                    </a:p>
-                  </a:txBody>
-                  <a:tcPr/>
-                </a:tc>
-                <a:tc>
-                  <a:txBody>
-                    <a:bodyPr/>
-                    <a:lstStyle/>
-                    <a:p>
-                      <a:endParaRPr lang="de-DE" dirty="0"/>
-                    </a:p>
-                  </a:txBody>
-                  <a:tcPr/>
-                </a:tc>
-                <a:tc>
-                  <a:txBody>
-                    <a:bodyPr/>
-                    <a:lstStyle/>
-                    <a:p>
-                      <a:endParaRPr lang="de-DE" dirty="0"/>
-                    </a:p>
-                  </a:txBody>
-                  <a:tcPr/>
-                </a:tc>
-                <a:extLst>
-                  <a:ext uri="{0D108BD9-81ED-4DB2-BD59-A6C34878D82A}">
-                    <a16:rowId xmlns:a16="http://schemas.microsoft.com/office/drawing/2014/main" val="124811157"/>
-                  </a:ext>
-                </a:extLst>
-              </a:tr>
-              <a:tr h="370840">
-                <a:tc vMerge="1">
-                  <a:txBody>
-                    <a:bodyPr/>
-                    <a:lstStyle/>
-                    <a:p>
-                      <a:endParaRPr lang="de-DE" dirty="0"/>
-                    </a:p>
-                  </a:txBody>
-                  <a:tcPr/>
-                </a:tc>
-                <a:tc>
-                  <a:txBody>
-                    <a:bodyPr/>
-                    <a:lstStyle/>
-                    <a:p>
-                      <a:r>
-                        <a:rPr lang="de-DE" dirty="0"/>
-                        <a:t>Nutzer-Doku</a:t>
-                      </a:r>
-                    </a:p>
-                  </a:txBody>
-                  <a:tcPr/>
-                </a:tc>
-                <a:tc>
-                  <a:txBody>
-                    <a:bodyPr/>
-                    <a:lstStyle/>
-                    <a:p>
-                      <a:endParaRPr lang="de-DE" dirty="0"/>
-                    </a:p>
-                  </a:txBody>
-                  <a:tcPr/>
-                </a:tc>
-                <a:tc>
-                  <a:txBody>
-                    <a:bodyPr/>
-                    <a:lstStyle/>
-                    <a:p>
-                      <a:endParaRPr lang="de-DE" dirty="0"/>
-                    </a:p>
-                  </a:txBody>
-                  <a:tcPr/>
-                </a:tc>
-                <a:tc>
-                  <a:txBody>
-                    <a:bodyPr/>
-                    <a:lstStyle/>
-                    <a:p>
-                      <a:endParaRPr lang="de-DE" dirty="0"/>
-                    </a:p>
-                  </a:txBody>
-                  <a:tcPr/>
-                </a:tc>
-                <a:tc>
-                  <a:txBody>
-                    <a:bodyPr/>
-                    <a:lstStyle/>
-                    <a:p>
-                      <a:endParaRPr lang="de-DE" dirty="0"/>
-                    </a:p>
-                  </a:txBody>
-                  <a:tcPr/>
-                </a:tc>
-                <a:tc>
-                  <a:txBody>
-                    <a:bodyPr/>
-                    <a:lstStyle/>
-                    <a:p>
-                      <a:endParaRPr lang="de-DE" dirty="0"/>
-                    </a:p>
-                  </a:txBody>
-                  <a:tcPr/>
-                </a:tc>
-                <a:tc>
-                  <a:txBody>
-                    <a:bodyPr/>
-                    <a:lstStyle/>
-                    <a:p>
-                      <a:endParaRPr lang="de-DE" dirty="0"/>
-                    </a:p>
-                  </a:txBody>
-                  <a:tcPr/>
-                </a:tc>
-                <a:extLst>
-                  <a:ext uri="{0D108BD9-81ED-4DB2-BD59-A6C34878D82A}">
-                    <a16:rowId xmlns:a16="http://schemas.microsoft.com/office/drawing/2014/main" val="510005107"/>
-                  </a:ext>
-                </a:extLst>
-              </a:tr>
-            </a:tbl>
-          </a:graphicData>
-        </a:graphic>
-      </p:graphicFrame>
-      <p:sp>
-        <p:nvSpPr>
-          <p:cNvPr id="5" name="Datumsplatzhalter 4"/>
-          <p:cNvSpPr>
-            <a:spLocks noGrp="1"/>
-          </p:cNvSpPr>
-          <p:nvPr>
-            <p:ph type="dt" sz="half" idx="10"/>
-          </p:nvPr>
-        </p:nvSpPr>
-        <p:spPr/>
-        <p:txBody>
-          <a:bodyPr/>
-          <a:lstStyle/>
-          <a:p>
-            <a:fld id="{5E3FA0F3-663C-4E4D-A9AD-FCEECA59737D}" type="datetime1">
-              <a:rPr lang="de-DE" smtClean="0"/>
-              <a:t>14.05.2018</a:t>
-            </a:fld>
-            <a:endParaRPr lang="de-DE"/>
-          </a:p>
-        </p:txBody>
-      </p:sp>
-      <p:sp>
-        <p:nvSpPr>
-          <p:cNvPr id="6" name="Foliennummernplatzhalter 5"/>
-          <p:cNvSpPr>
-            <a:spLocks noGrp="1"/>
-          </p:cNvSpPr>
-          <p:nvPr>
-            <p:ph type="sldNum" sz="quarter" idx="12"/>
-          </p:nvPr>
-        </p:nvSpPr>
-        <p:spPr/>
-        <p:txBody>
-          <a:bodyPr/>
-          <a:lstStyle/>
-          <a:p>
-            <a:fld id="{C9BFD74B-BF5B-4F1B-BDFB-3F89FD2A71A6}" type="slidenum">
-              <a:rPr lang="de-DE" smtClean="0"/>
-              <a:t>13</a:t>
-            </a:fld>
-            <a:endParaRPr lang="de-DE"/>
-          </a:p>
-        </p:txBody>
-      </p:sp>
-    </p:spTree>
-    <p:extLst>
-      <p:ext uri="{BB962C8B-B14F-4D97-AF65-F5344CB8AC3E}">
-        <p14:creationId xmlns:p14="http://schemas.microsoft.com/office/powerpoint/2010/main" val="1348159509"/>
-      </p:ext>
-    </p:extLst>
-  </p:cSld>
-  <p:clrMapOvr>
-    <a:masterClrMapping/>
-  </p:clrMapOvr>
-</p:sld>
-</file>
-
-<file path=ppt/slides/slide14.xml><?xml version="1.0" encoding="utf-8"?>
-<p:sld xmlns:a="http://schemas.openxmlformats.org/drawingml/2006/main" xmlns:r="http://schemas.openxmlformats.org/officeDocument/2006/relationships" xmlns:p="http://schemas.openxmlformats.org/presentationml/2006/main">
-  <p:cSld>
-    <p:spTree>
-      <p:nvGrpSpPr>
-        <p:cNvPr id="1" name=""/>
-        <p:cNvGrpSpPr/>
-        <p:nvPr/>
-      </p:nvGrpSpPr>
-      <p:grpSpPr>
-        <a:xfrm>
-          <a:off x="0" y="0"/>
-          <a:ext cx="0" cy="0"/>
-          <a:chOff x="0" y="0"/>
-          <a:chExt cx="0" cy="0"/>
-        </a:xfrm>
-      </p:grpSpPr>
-      <p:sp>
-        <p:nvSpPr>
-          <p:cNvPr id="2" name="Titel 1">
-            <a:extLst>
-              <a:ext uri="{FF2B5EF4-FFF2-40B4-BE49-F238E27FC236}">
-                <a16:creationId xmlns:a16="http://schemas.microsoft.com/office/drawing/2014/main" id="{C4D7A07A-106A-408F-BFBF-C324D78A9C82}"/>
-              </a:ext>
-            </a:extLst>
-          </p:cNvPr>
-          <p:cNvSpPr>
-            <a:spLocks noGrp="1"/>
-          </p:cNvSpPr>
-          <p:nvPr>
-            <p:ph type="title"/>
-          </p:nvPr>
-        </p:nvSpPr>
-        <p:spPr/>
-        <p:txBody>
-          <a:bodyPr/>
-          <a:lstStyle/>
-          <a:p>
-            <a:endParaRPr lang="de-DE" dirty="0"/>
-          </a:p>
-        </p:txBody>
-      </p:sp>
-      <p:sp>
-        <p:nvSpPr>
-          <p:cNvPr id="3" name="Inhaltsplatzhalter 2">
-            <a:extLst>
-              <a:ext uri="{FF2B5EF4-FFF2-40B4-BE49-F238E27FC236}">
-                <a16:creationId xmlns:a16="http://schemas.microsoft.com/office/drawing/2014/main" id="{4944B1DE-1CF5-4452-BD6B-4852660E222B}"/>
-              </a:ext>
-            </a:extLst>
-          </p:cNvPr>
-          <p:cNvSpPr>
-            <a:spLocks noGrp="1"/>
-          </p:cNvSpPr>
-          <p:nvPr>
-            <p:ph idx="1"/>
-          </p:nvPr>
-        </p:nvSpPr>
-        <p:spPr/>
-        <p:txBody>
-          <a:bodyPr/>
-          <a:lstStyle/>
-          <a:p>
-            <a:endParaRPr lang="de-DE" dirty="0"/>
-          </a:p>
-        </p:txBody>
-      </p:sp>
-      <p:sp>
-        <p:nvSpPr>
-          <p:cNvPr id="4" name="Datumsplatzhalter 3">
-            <a:extLst>
-              <a:ext uri="{FF2B5EF4-FFF2-40B4-BE49-F238E27FC236}">
-                <a16:creationId xmlns:a16="http://schemas.microsoft.com/office/drawing/2014/main" id="{53BE79EA-8267-4354-80CC-B2F29733ED5F}"/>
-              </a:ext>
-            </a:extLst>
-          </p:cNvPr>
-          <p:cNvSpPr>
-            <a:spLocks noGrp="1"/>
-          </p:cNvSpPr>
-          <p:nvPr>
-            <p:ph type="dt" sz="half" idx="10"/>
-          </p:nvPr>
-        </p:nvSpPr>
-        <p:spPr/>
-        <p:txBody>
-          <a:bodyPr/>
-          <a:lstStyle/>
-          <a:p>
-            <a:fld id="{BBFFFFB7-B427-4FC9-89B5-E815E530C709}" type="datetime1">
-              <a:rPr lang="de-DE" smtClean="0"/>
-              <a:t>14.05.2018</a:t>
-            </a:fld>
-            <a:endParaRPr lang="de-DE"/>
-          </a:p>
-        </p:txBody>
-      </p:sp>
-      <p:sp>
-        <p:nvSpPr>
-          <p:cNvPr id="5" name="Foliennummernplatzhalter 4">
-            <a:extLst>
-              <a:ext uri="{FF2B5EF4-FFF2-40B4-BE49-F238E27FC236}">
-                <a16:creationId xmlns:a16="http://schemas.microsoft.com/office/drawing/2014/main" id="{FBE45DFE-3220-40B2-BB1B-C0FBED55FF34}"/>
-              </a:ext>
-            </a:extLst>
-          </p:cNvPr>
-          <p:cNvSpPr>
-            <a:spLocks noGrp="1"/>
-          </p:cNvSpPr>
-          <p:nvPr>
-            <p:ph type="sldNum" sz="quarter" idx="12"/>
-          </p:nvPr>
-        </p:nvSpPr>
-        <p:spPr/>
-        <p:txBody>
-          <a:bodyPr/>
-          <a:lstStyle/>
-          <a:p>
-            <a:fld id="{C9BFD74B-BF5B-4F1B-BDFB-3F89FD2A71A6}" type="slidenum">
-              <a:rPr lang="de-DE" smtClean="0"/>
-              <a:t>14</a:t>
-            </a:fld>
-            <a:endParaRPr lang="de-DE"/>
-          </a:p>
-        </p:txBody>
-      </p:sp>
-      <p:graphicFrame>
-        <p:nvGraphicFramePr>
-          <p:cNvPr id="6" name="Inhaltsplatzhalter 1">
-            <a:extLst>
-              <a:ext uri="{FF2B5EF4-FFF2-40B4-BE49-F238E27FC236}">
-                <a16:creationId xmlns:a16="http://schemas.microsoft.com/office/drawing/2014/main" id="{8BA9E4B6-7293-4870-93E6-B651B41A90A9}"/>
-              </a:ext>
-            </a:extLst>
-          </p:cNvPr>
-          <p:cNvGraphicFramePr>
-            <a:graphicFrameLocks/>
-          </p:cNvGraphicFramePr>
-          <p:nvPr>
-            <p:extLst>
-              <p:ext uri="{D42A27DB-BD31-4B8C-83A1-F6EECF244321}">
-                <p14:modId xmlns:p14="http://schemas.microsoft.com/office/powerpoint/2010/main" val="3152685586"/>
-              </p:ext>
-            </p:extLst>
-          </p:nvPr>
-        </p:nvGraphicFramePr>
-        <p:xfrm>
-          <a:off x="301780" y="941033"/>
-          <a:ext cx="11649399" cy="3879269"/>
-        </p:xfrm>
-        <a:graphic>
-          <a:graphicData uri="http://schemas.openxmlformats.org/drawingml/2006/table">
-            <a:tbl>
-              <a:tblPr firstRow="1" bandRow="1">
-                <a:tableStyleId>{5C22544A-7EE6-4342-B048-85BDC9FD1C3A}</a:tableStyleId>
-              </a:tblPr>
-              <a:tblGrid>
-                <a:gridCol w="1895399">
-                  <a:extLst>
-                    <a:ext uri="{9D8B030D-6E8A-4147-A177-3AD203B41FA5}">
-                      <a16:colId xmlns:a16="http://schemas.microsoft.com/office/drawing/2014/main" val="2740601797"/>
-                    </a:ext>
-                  </a:extLst>
-                </a:gridCol>
-                <a:gridCol w="2570551">
-                  <a:extLst>
-                    <a:ext uri="{9D8B030D-6E8A-4147-A177-3AD203B41FA5}">
-                      <a16:colId xmlns:a16="http://schemas.microsoft.com/office/drawing/2014/main" val="130159350"/>
-                    </a:ext>
-                  </a:extLst>
-                </a:gridCol>
-                <a:gridCol w="1066186">
-                  <a:extLst>
-                    <a:ext uri="{9D8B030D-6E8A-4147-A177-3AD203B41FA5}">
-                      <a16:colId xmlns:a16="http://schemas.microsoft.com/office/drawing/2014/main" val="851099838"/>
-                    </a:ext>
-                  </a:extLst>
-                </a:gridCol>
-                <a:gridCol w="1066186">
-                  <a:extLst>
-                    <a:ext uri="{9D8B030D-6E8A-4147-A177-3AD203B41FA5}">
-                      <a16:colId xmlns:a16="http://schemas.microsoft.com/office/drawing/2014/main" val="2919539333"/>
-                    </a:ext>
-                  </a:extLst>
-                </a:gridCol>
-                <a:gridCol w="1437873">
-                  <a:extLst>
-                    <a:ext uri="{9D8B030D-6E8A-4147-A177-3AD203B41FA5}">
-                      <a16:colId xmlns:a16="http://schemas.microsoft.com/office/drawing/2014/main" val="3251378671"/>
-                    </a:ext>
-                  </a:extLst>
-                </a:gridCol>
-                <a:gridCol w="1019493">
-                  <a:extLst>
-                    <a:ext uri="{9D8B030D-6E8A-4147-A177-3AD203B41FA5}">
-                      <a16:colId xmlns:a16="http://schemas.microsoft.com/office/drawing/2014/main" val="1017323343"/>
-                    </a:ext>
-                  </a:extLst>
-                </a:gridCol>
-                <a:gridCol w="1155838">
-                  <a:extLst>
-                    <a:ext uri="{9D8B030D-6E8A-4147-A177-3AD203B41FA5}">
-                      <a16:colId xmlns:a16="http://schemas.microsoft.com/office/drawing/2014/main" val="754126515"/>
-                    </a:ext>
-                  </a:extLst>
-                </a:gridCol>
-                <a:gridCol w="1437873">
-                  <a:extLst>
-                    <a:ext uri="{9D8B030D-6E8A-4147-A177-3AD203B41FA5}">
-                      <a16:colId xmlns:a16="http://schemas.microsoft.com/office/drawing/2014/main" val="507640895"/>
-                    </a:ext>
-                  </a:extLst>
-                </a:gridCol>
-              </a:tblGrid>
-              <a:tr h="371149">
-                <a:tc>
-                  <a:txBody>
-                    <a:bodyPr/>
-                    <a:lstStyle/>
-                    <a:p>
-                      <a:pPr algn="l"/>
-                      <a:r>
-                        <a:rPr lang="de-DE" dirty="0"/>
-                        <a:t>Thema</a:t>
-                      </a:r>
-                    </a:p>
-                  </a:txBody>
-                  <a:tcPr/>
-                </a:tc>
-                <a:tc>
-                  <a:txBody>
-                    <a:bodyPr/>
-                    <a:lstStyle/>
-                    <a:p>
-                      <a:pPr algn="l"/>
-                      <a:r>
-                        <a:rPr lang="de-DE" dirty="0"/>
-                        <a:t>Kriterium</a:t>
-                      </a:r>
-                    </a:p>
-                  </a:txBody>
-                  <a:tcPr/>
-                </a:tc>
-                <a:tc>
-                  <a:txBody>
-                    <a:bodyPr/>
-                    <a:lstStyle/>
-                    <a:p>
-                      <a:pPr algn="l"/>
-                      <a:r>
-                        <a:rPr lang="de-DE" dirty="0"/>
-                        <a:t>Gatling</a:t>
-                      </a:r>
-                    </a:p>
-                  </a:txBody>
-                  <a:tcPr/>
-                </a:tc>
-                <a:tc>
-                  <a:txBody>
-                    <a:bodyPr/>
-                    <a:lstStyle/>
-                    <a:p>
-                      <a:pPr algn="l"/>
-                      <a:r>
-                        <a:rPr lang="de-DE" dirty="0" err="1"/>
-                        <a:t>Locust</a:t>
-                      </a:r>
-                      <a:endParaRPr lang="de-DE" dirty="0"/>
-                    </a:p>
-                  </a:txBody>
-                  <a:tcPr/>
-                </a:tc>
-                <a:tc>
-                  <a:txBody>
-                    <a:bodyPr/>
-                    <a:lstStyle/>
-                    <a:p>
-                      <a:pPr algn="l"/>
-                      <a:r>
-                        <a:rPr lang="de-DE" dirty="0"/>
-                        <a:t>Apache AB</a:t>
-                      </a:r>
-                    </a:p>
-                  </a:txBody>
-                  <a:tcPr/>
-                </a:tc>
-                <a:tc>
-                  <a:txBody>
-                    <a:bodyPr/>
-                    <a:lstStyle/>
-                    <a:p>
-                      <a:pPr algn="l"/>
-                      <a:r>
-                        <a:rPr lang="de-DE" dirty="0"/>
-                        <a:t>k6</a:t>
-                      </a:r>
-                    </a:p>
-                  </a:txBody>
-                  <a:tcPr/>
-                </a:tc>
-                <a:tc>
-                  <a:txBody>
-                    <a:bodyPr/>
-                    <a:lstStyle/>
-                    <a:p>
-                      <a:pPr algn="l"/>
-                      <a:r>
-                        <a:rPr lang="de-DE" dirty="0" err="1"/>
-                        <a:t>nGrinder</a:t>
-                      </a:r>
-                      <a:endParaRPr lang="de-DE" dirty="0"/>
-                    </a:p>
-                  </a:txBody>
-                  <a:tcPr/>
-                </a:tc>
-                <a:tc>
-                  <a:txBody>
-                    <a:bodyPr/>
-                    <a:lstStyle/>
-                    <a:p>
-                      <a:pPr algn="l"/>
-                      <a:r>
-                        <a:rPr lang="de-DE" dirty="0"/>
-                        <a:t>Taurus</a:t>
-                      </a:r>
-                    </a:p>
-                  </a:txBody>
-                  <a:tcPr/>
-                </a:tc>
-                <a:extLst>
-                  <a:ext uri="{0D108BD9-81ED-4DB2-BD59-A6C34878D82A}">
-                    <a16:rowId xmlns:a16="http://schemas.microsoft.com/office/drawing/2014/main" val="1540211511"/>
-                  </a:ext>
-                </a:extLst>
-              </a:tr>
-              <a:tr h="371149">
-                <a:tc>
-                  <a:txBody>
-                    <a:bodyPr/>
-                    <a:lstStyle/>
-                    <a:p>
-                      <a:pPr algn="l"/>
-                      <a:r>
-                        <a:rPr lang="de-DE" dirty="0"/>
-                        <a:t>Mängel / Bugs</a:t>
-                      </a:r>
-                    </a:p>
-                  </a:txBody>
-                  <a:tcPr/>
-                </a:tc>
-                <a:tc>
-                  <a:txBody>
-                    <a:bodyPr/>
-                    <a:lstStyle/>
-                    <a:p>
-                      <a:pPr algn="l"/>
-                      <a:r>
-                        <a:rPr lang="de-DE" dirty="0"/>
-                        <a:t>Kritische Bugs?</a:t>
-                      </a:r>
-                    </a:p>
-                  </a:txBody>
-                  <a:tcPr/>
-                </a:tc>
-                <a:tc>
-                  <a:txBody>
-                    <a:bodyPr/>
-                    <a:lstStyle/>
-                    <a:p>
-                      <a:pPr algn="l"/>
-                      <a:endParaRPr lang="de-DE" dirty="0"/>
-                    </a:p>
-                  </a:txBody>
-                  <a:tcPr>
-                    <a:solidFill>
-                      <a:srgbClr val="92D050"/>
-                    </a:solidFill>
-                  </a:tcPr>
-                </a:tc>
-                <a:tc>
-                  <a:txBody>
-                    <a:bodyPr/>
-                    <a:lstStyle/>
-                    <a:p>
-                      <a:pPr algn="l"/>
-                      <a:endParaRPr lang="de-DE" dirty="0"/>
-                    </a:p>
-                  </a:txBody>
-                  <a:tcPr>
-                    <a:solidFill>
-                      <a:srgbClr val="92D050"/>
-                    </a:solidFill>
-                  </a:tcPr>
-                </a:tc>
-                <a:tc>
-                  <a:txBody>
-                    <a:bodyPr/>
-                    <a:lstStyle/>
-                    <a:p>
-                      <a:pPr algn="l"/>
-                      <a:endParaRPr lang="de-DE" dirty="0"/>
-                    </a:p>
-                  </a:txBody>
-                  <a:tcPr>
-                    <a:solidFill>
-                      <a:srgbClr val="92D050"/>
-                    </a:solidFill>
-                  </a:tcPr>
-                </a:tc>
-                <a:tc>
-                  <a:txBody>
-                    <a:bodyPr/>
-                    <a:lstStyle/>
-                    <a:p>
-                      <a:pPr algn="l"/>
-                      <a:endParaRPr lang="de-DE" dirty="0"/>
-                    </a:p>
-                  </a:txBody>
-                  <a:tcPr>
-                    <a:solidFill>
-                      <a:srgbClr val="FF0000"/>
-                    </a:solidFill>
-                  </a:tcPr>
-                </a:tc>
-                <a:tc>
-                  <a:txBody>
-                    <a:bodyPr/>
-                    <a:lstStyle/>
-                    <a:p>
-                      <a:pPr algn="l"/>
-                      <a:endParaRPr lang="de-DE" dirty="0"/>
-                    </a:p>
-                  </a:txBody>
-                  <a:tcPr>
-                    <a:solidFill>
-                      <a:srgbClr val="92D050"/>
-                    </a:solidFill>
-                  </a:tcPr>
-                </a:tc>
-                <a:tc>
-                  <a:txBody>
-                    <a:bodyPr/>
-                    <a:lstStyle/>
-                    <a:p>
-                      <a:pPr algn="l"/>
-                      <a:endParaRPr lang="de-DE" dirty="0"/>
-                    </a:p>
-                  </a:txBody>
-                  <a:tcPr>
-                    <a:solidFill>
-                      <a:srgbClr val="92D050"/>
-                    </a:solidFill>
-                  </a:tcPr>
-                </a:tc>
-                <a:extLst>
-                  <a:ext uri="{0D108BD9-81ED-4DB2-BD59-A6C34878D82A}">
-                    <a16:rowId xmlns:a16="http://schemas.microsoft.com/office/drawing/2014/main" val="2067020263"/>
-                  </a:ext>
-                </a:extLst>
-              </a:tr>
-              <a:tr h="371149">
-                <a:tc rowSpan="2">
-                  <a:txBody>
-                    <a:bodyPr/>
-                    <a:lstStyle/>
-                    <a:p>
-                      <a:pPr algn="l"/>
-                      <a:r>
-                        <a:rPr lang="de-DE" dirty="0"/>
-                        <a:t>Bekanntheitsgrad</a:t>
-                      </a:r>
-                    </a:p>
-                  </a:txBody>
-                  <a:tcPr anchor="ctr"/>
-                </a:tc>
-                <a:tc>
-                  <a:txBody>
-                    <a:bodyPr/>
-                    <a:lstStyle/>
-                    <a:p>
-                      <a:pPr algn="l"/>
-                      <a:r>
-                        <a:rPr lang="de-DE" dirty="0" err="1"/>
-                        <a:t>GoogleTrends</a:t>
-                      </a:r>
-                      <a:endParaRPr lang="de-DE" dirty="0"/>
-                    </a:p>
-                  </a:txBody>
-                  <a:tcPr/>
-                </a:tc>
-                <a:tc>
-                  <a:txBody>
-                    <a:bodyPr/>
-                    <a:lstStyle/>
-                    <a:p>
-                      <a:pPr algn="l"/>
-                      <a:endParaRPr lang="de-DE" dirty="0"/>
-                    </a:p>
-                  </a:txBody>
-                  <a:tcPr>
-                    <a:solidFill>
-                      <a:srgbClr val="92D050"/>
-                    </a:solidFill>
-                  </a:tcPr>
-                </a:tc>
-                <a:tc>
-                  <a:txBody>
-                    <a:bodyPr/>
-                    <a:lstStyle/>
-                    <a:p>
-                      <a:pPr algn="l"/>
-                      <a:endParaRPr lang="de-DE" dirty="0"/>
-                    </a:p>
-                  </a:txBody>
-                  <a:tcPr>
-                    <a:solidFill>
-                      <a:srgbClr val="FF0000"/>
-                    </a:solidFill>
-                  </a:tcPr>
-                </a:tc>
-                <a:tc>
-                  <a:txBody>
-                    <a:bodyPr/>
-                    <a:lstStyle/>
-                    <a:p>
-                      <a:pPr algn="l"/>
-                      <a:endParaRPr lang="de-DE" dirty="0"/>
-                    </a:p>
-                  </a:txBody>
-                  <a:tcPr/>
-                </a:tc>
-                <a:tc>
-                  <a:txBody>
-                    <a:bodyPr/>
-                    <a:lstStyle/>
-                    <a:p>
-                      <a:pPr algn="l"/>
-                      <a:endParaRPr lang="de-DE" dirty="0"/>
-                    </a:p>
-                  </a:txBody>
-                  <a:tcPr>
-                    <a:solidFill>
-                      <a:srgbClr val="FF0000"/>
-                    </a:solidFill>
-                  </a:tcPr>
-                </a:tc>
-                <a:tc>
-                  <a:txBody>
-                    <a:bodyPr/>
-                    <a:lstStyle/>
-                    <a:p>
-                      <a:pPr algn="l"/>
-                      <a:endParaRPr lang="de-DE" dirty="0"/>
-                    </a:p>
-                  </a:txBody>
-                  <a:tcPr>
-                    <a:solidFill>
-                      <a:srgbClr val="FF0000"/>
-                    </a:solidFill>
-                  </a:tcPr>
-                </a:tc>
-                <a:tc>
-                  <a:txBody>
-                    <a:bodyPr/>
-                    <a:lstStyle/>
-                    <a:p>
-                      <a:pPr algn="l"/>
-                      <a:endParaRPr lang="de-DE" dirty="0"/>
-                    </a:p>
-                  </a:txBody>
-                  <a:tcPr>
-                    <a:solidFill>
-                      <a:srgbClr val="92D050"/>
-                    </a:solidFill>
-                  </a:tcPr>
-                </a:tc>
-                <a:extLst>
-                  <a:ext uri="{0D108BD9-81ED-4DB2-BD59-A6C34878D82A}">
-                    <a16:rowId xmlns:a16="http://schemas.microsoft.com/office/drawing/2014/main" val="1717473814"/>
-                  </a:ext>
-                </a:extLst>
-              </a:tr>
-              <a:tr h="371149">
-                <a:tc vMerge="1">
-                  <a:txBody>
-                    <a:bodyPr/>
-                    <a:lstStyle/>
-                    <a:p>
-                      <a:endParaRPr lang="de-DE" dirty="0"/>
-                    </a:p>
-                  </a:txBody>
-                  <a:tcPr/>
-                </a:tc>
-                <a:tc>
-                  <a:txBody>
-                    <a:bodyPr/>
-                    <a:lstStyle/>
-                    <a:p>
-                      <a:pPr algn="l"/>
-                      <a:r>
-                        <a:rPr lang="de-DE" dirty="0" err="1"/>
-                        <a:t>StackOverflow</a:t>
-                      </a:r>
-                      <a:endParaRPr lang="de-DE" dirty="0"/>
-                    </a:p>
-                  </a:txBody>
-                  <a:tcPr/>
-                </a:tc>
-                <a:tc>
-                  <a:txBody>
-                    <a:bodyPr/>
-                    <a:lstStyle/>
-                    <a:p>
-                      <a:pPr algn="l"/>
-                      <a:endParaRPr lang="de-DE" dirty="0"/>
-                    </a:p>
-                  </a:txBody>
-                  <a:tcPr>
-                    <a:solidFill>
-                      <a:srgbClr val="92D050"/>
-                    </a:solidFill>
-                  </a:tcPr>
-                </a:tc>
-                <a:tc>
-                  <a:txBody>
-                    <a:bodyPr/>
-                    <a:lstStyle/>
-                    <a:p>
-                      <a:pPr algn="l"/>
-                      <a:endParaRPr lang="de-DE" dirty="0"/>
-                    </a:p>
-                  </a:txBody>
-                  <a:tcPr>
-                    <a:solidFill>
-                      <a:srgbClr val="92D050"/>
-                    </a:solidFill>
-                  </a:tcPr>
-                </a:tc>
-                <a:tc>
-                  <a:txBody>
-                    <a:bodyPr/>
-                    <a:lstStyle/>
-                    <a:p>
-                      <a:pPr algn="l"/>
-                      <a:endParaRPr lang="de-DE" dirty="0"/>
-                    </a:p>
-                  </a:txBody>
-                  <a:tcPr/>
-                </a:tc>
-                <a:tc>
-                  <a:txBody>
-                    <a:bodyPr/>
-                    <a:lstStyle/>
-                    <a:p>
-                      <a:pPr algn="l"/>
-                      <a:endParaRPr lang="de-DE" dirty="0"/>
-                    </a:p>
-                  </a:txBody>
-                  <a:tcPr>
-                    <a:solidFill>
-                      <a:srgbClr val="92D050"/>
-                    </a:solidFill>
-                  </a:tcPr>
-                </a:tc>
-                <a:tc>
-                  <a:txBody>
-                    <a:bodyPr/>
-                    <a:lstStyle/>
-                    <a:p>
-                      <a:pPr algn="l"/>
-                      <a:endParaRPr lang="de-DE" dirty="0"/>
-                    </a:p>
-                  </a:txBody>
-                  <a:tcPr>
-                    <a:solidFill>
-                      <a:srgbClr val="92D050"/>
-                    </a:solidFill>
-                  </a:tcPr>
-                </a:tc>
-                <a:tc>
-                  <a:txBody>
-                    <a:bodyPr/>
-                    <a:lstStyle/>
-                    <a:p>
-                      <a:pPr algn="l"/>
-                      <a:endParaRPr lang="de-DE" dirty="0"/>
-                    </a:p>
-                  </a:txBody>
-                  <a:tcPr>
-                    <a:solidFill>
-                      <a:srgbClr val="92D050"/>
-                    </a:solidFill>
-                  </a:tcPr>
-                </a:tc>
-                <a:extLst>
-                  <a:ext uri="{0D108BD9-81ED-4DB2-BD59-A6C34878D82A}">
-                    <a16:rowId xmlns:a16="http://schemas.microsoft.com/office/drawing/2014/main" val="3172502802"/>
-                  </a:ext>
-                </a:extLst>
-              </a:tr>
-              <a:tr h="640613">
-                <a:tc>
-                  <a:txBody>
-                    <a:bodyPr/>
-                    <a:lstStyle/>
-                    <a:p>
-                      <a:r>
-                        <a:rPr lang="de-DE" dirty="0"/>
-                        <a:t>Innere Qualität</a:t>
-                      </a:r>
-                    </a:p>
-                  </a:txBody>
-                  <a:tcPr anchor="ctr"/>
-                </a:tc>
-                <a:tc>
-                  <a:txBody>
-                    <a:bodyPr/>
-                    <a:lstStyle/>
-                    <a:p>
-                      <a:pPr algn="l"/>
-                      <a:r>
-                        <a:rPr lang="de-DE" dirty="0"/>
-                        <a:t>Coverage &gt; 30%</a:t>
-                      </a:r>
-                    </a:p>
-                    <a:p>
-                      <a:pPr algn="l"/>
-                      <a:r>
-                        <a:rPr lang="de-DE" dirty="0"/>
-                        <a:t>Comments &gt; 15%</a:t>
-                      </a:r>
-                    </a:p>
-                  </a:txBody>
-                  <a:tcPr/>
-                </a:tc>
-                <a:tc>
-                  <a:txBody>
-                    <a:bodyPr/>
-                    <a:lstStyle/>
-                    <a:p>
-                      <a:pPr algn="l"/>
-                      <a:r>
-                        <a:rPr lang="de-DE" dirty="0"/>
-                        <a:t>0%</a:t>
-                      </a:r>
-                    </a:p>
-                    <a:p>
-                      <a:pPr algn="l"/>
-                      <a:r>
-                        <a:rPr lang="de-DE" dirty="0"/>
-                        <a:t>3.2%</a:t>
-                      </a:r>
-                    </a:p>
-                  </a:txBody>
-                  <a:tcPr>
-                    <a:solidFill>
-                      <a:srgbClr val="FF0000"/>
-                    </a:solidFill>
-                  </a:tcPr>
-                </a:tc>
-                <a:tc>
-                  <a:txBody>
-                    <a:bodyPr/>
-                    <a:lstStyle/>
-                    <a:p>
-                      <a:pPr algn="l"/>
-                      <a:r>
-                        <a:rPr lang="de-DE" dirty="0"/>
-                        <a:t>27%</a:t>
-                      </a:r>
-                    </a:p>
-                    <a:p>
-                      <a:pPr algn="l"/>
-                      <a:r>
-                        <a:rPr lang="de-DE" dirty="0"/>
-                        <a:t>13.4%</a:t>
-                      </a:r>
-                    </a:p>
-                  </a:txBody>
-                  <a:tcPr>
-                    <a:solidFill>
-                      <a:srgbClr val="FFFF00"/>
-                    </a:solidFill>
-                  </a:tcPr>
-                </a:tc>
-                <a:tc>
-                  <a:txBody>
-                    <a:bodyPr/>
-                    <a:lstStyle/>
-                    <a:p>
-                      <a:pPr algn="l"/>
-                      <a:endParaRPr lang="de-DE" dirty="0"/>
-                    </a:p>
-                  </a:txBody>
-                  <a:tcPr/>
-                </a:tc>
-                <a:tc>
-                  <a:txBody>
-                    <a:bodyPr/>
-                    <a:lstStyle/>
-                    <a:p>
-                      <a:pPr algn="l"/>
-                      <a:endParaRPr lang="de-DE"/>
-                    </a:p>
-                  </a:txBody>
-                  <a:tcPr/>
-                </a:tc>
-                <a:tc>
-                  <a:txBody>
-                    <a:bodyPr/>
-                    <a:lstStyle/>
-                    <a:p>
-                      <a:pPr algn="l"/>
-                      <a:endParaRPr lang="de-DE"/>
-                    </a:p>
-                  </a:txBody>
-                  <a:tcPr/>
-                </a:tc>
-                <a:tc>
-                  <a:txBody>
-                    <a:bodyPr/>
-                    <a:lstStyle/>
-                    <a:p>
-                      <a:pPr algn="l"/>
-                      <a:endParaRPr lang="de-DE" dirty="0"/>
-                    </a:p>
-                  </a:txBody>
-                  <a:tcPr/>
-                </a:tc>
-                <a:extLst>
-                  <a:ext uri="{0D108BD9-81ED-4DB2-BD59-A6C34878D82A}">
-                    <a16:rowId xmlns:a16="http://schemas.microsoft.com/office/drawing/2014/main" val="468078094"/>
-                  </a:ext>
-                </a:extLst>
-              </a:tr>
-              <a:tr h="371149">
-                <a:tc rowSpan="4">
-                  <a:txBody>
-                    <a:bodyPr/>
-                    <a:lstStyle/>
-                    <a:p>
-                      <a:pPr algn="l"/>
-                      <a:r>
-                        <a:rPr lang="de-DE" dirty="0"/>
-                        <a:t>Projekt Aktivität</a:t>
-                      </a:r>
-                    </a:p>
-                  </a:txBody>
-                  <a:tcPr anchor="ctr"/>
-                </a:tc>
-                <a:tc>
-                  <a:txBody>
-                    <a:bodyPr/>
-                    <a:lstStyle/>
-                    <a:p>
-                      <a:pPr algn="l"/>
-                      <a:r>
-                        <a:rPr lang="de-DE" dirty="0"/>
-                        <a:t>Auf </a:t>
-                      </a:r>
-                      <a:r>
-                        <a:rPr lang="de-DE" dirty="0" err="1"/>
-                        <a:t>Ohloh</a:t>
-                      </a:r>
-                      <a:r>
-                        <a:rPr lang="de-DE" dirty="0"/>
-                        <a:t> gelistet</a:t>
-                      </a:r>
-                    </a:p>
-                  </a:txBody>
-                  <a:tcPr/>
-                </a:tc>
-                <a:tc>
-                  <a:txBody>
-                    <a:bodyPr/>
-                    <a:lstStyle/>
-                    <a:p>
-                      <a:pPr algn="l"/>
-                      <a:r>
-                        <a:rPr lang="de-DE" dirty="0"/>
-                        <a:t>Ja</a:t>
-                      </a:r>
-                    </a:p>
-                  </a:txBody>
-                  <a:tcPr>
-                    <a:solidFill>
-                      <a:srgbClr val="92D050"/>
-                    </a:solidFill>
-                  </a:tcPr>
-                </a:tc>
-                <a:tc>
-                  <a:txBody>
-                    <a:bodyPr/>
-                    <a:lstStyle/>
-                    <a:p>
-                      <a:pPr algn="l"/>
-                      <a:r>
-                        <a:rPr lang="de-DE" dirty="0"/>
-                        <a:t>Ja</a:t>
-                      </a:r>
-                    </a:p>
-                  </a:txBody>
-                  <a:tcPr>
-                    <a:solidFill>
-                      <a:srgbClr val="92D050"/>
-                    </a:solidFill>
-                  </a:tcPr>
-                </a:tc>
-                <a:tc>
-                  <a:txBody>
-                    <a:bodyPr/>
-                    <a:lstStyle/>
-                    <a:p>
-                      <a:pPr algn="l"/>
-                      <a:r>
-                        <a:rPr lang="de-DE" dirty="0"/>
-                        <a:t>Ja</a:t>
-                      </a:r>
-                    </a:p>
-                  </a:txBody>
-                  <a:tcPr>
-                    <a:solidFill>
-                      <a:srgbClr val="92D050"/>
-                    </a:solidFill>
-                  </a:tcPr>
-                </a:tc>
-                <a:tc>
-                  <a:txBody>
-                    <a:bodyPr/>
-                    <a:lstStyle/>
-                    <a:p>
-                      <a:pPr algn="l"/>
-                      <a:r>
-                        <a:rPr lang="de-DE" dirty="0"/>
-                        <a:t>Nein</a:t>
-                      </a:r>
-                    </a:p>
-                  </a:txBody>
-                  <a:tcPr>
-                    <a:solidFill>
-                      <a:srgbClr val="FF0000"/>
-                    </a:solidFill>
-                  </a:tcPr>
-                </a:tc>
-                <a:tc>
-                  <a:txBody>
-                    <a:bodyPr/>
-                    <a:lstStyle/>
-                    <a:p>
-                      <a:pPr algn="l"/>
-                      <a:r>
-                        <a:rPr lang="de-DE" dirty="0"/>
-                        <a:t>Ja</a:t>
-                      </a:r>
-                    </a:p>
-                  </a:txBody>
-                  <a:tcPr>
-                    <a:solidFill>
-                      <a:srgbClr val="92D050"/>
-                    </a:solidFill>
-                  </a:tcPr>
-                </a:tc>
-                <a:tc>
-                  <a:txBody>
-                    <a:bodyPr/>
-                    <a:lstStyle/>
-                    <a:p>
-                      <a:pPr algn="l"/>
-                      <a:r>
-                        <a:rPr lang="de-DE" dirty="0"/>
-                        <a:t>Nein</a:t>
-                      </a:r>
-                    </a:p>
-                  </a:txBody>
-                  <a:tcPr>
-                    <a:solidFill>
-                      <a:srgbClr val="FF0000"/>
-                    </a:solidFill>
-                  </a:tcPr>
-                </a:tc>
-                <a:extLst>
-                  <a:ext uri="{0D108BD9-81ED-4DB2-BD59-A6C34878D82A}">
-                    <a16:rowId xmlns:a16="http://schemas.microsoft.com/office/drawing/2014/main" val="3465109363"/>
-                  </a:ext>
-                </a:extLst>
-              </a:tr>
-              <a:tr h="640613">
-                <a:tc vMerge="1">
-                  <a:txBody>
-                    <a:bodyPr/>
-                    <a:lstStyle/>
-                    <a:p>
-                      <a:endParaRPr lang="de-DE" dirty="0"/>
-                    </a:p>
-                  </a:txBody>
-                  <a:tcPr/>
-                </a:tc>
-                <a:tc>
-                  <a:txBody>
-                    <a:bodyPr/>
-                    <a:lstStyle/>
-                    <a:p>
-                      <a:pPr algn="l"/>
-                      <a:r>
-                        <a:rPr lang="de-DE" dirty="0"/>
-                        <a:t>Min. 1 Release im letzten Jahr</a:t>
-                      </a:r>
-                    </a:p>
-                  </a:txBody>
-                  <a:tcPr/>
-                </a:tc>
-                <a:tc>
-                  <a:txBody>
-                    <a:bodyPr/>
-                    <a:lstStyle/>
-                    <a:p>
-                      <a:pPr algn="l"/>
-                      <a:r>
-                        <a:rPr lang="de-DE" dirty="0"/>
-                        <a:t>04/2016</a:t>
-                      </a:r>
-                    </a:p>
-                  </a:txBody>
-                  <a:tcPr>
-                    <a:solidFill>
-                      <a:srgbClr val="FF0000"/>
-                    </a:solidFill>
-                  </a:tcPr>
-                </a:tc>
-                <a:tc>
-                  <a:txBody>
-                    <a:bodyPr/>
-                    <a:lstStyle/>
-                    <a:p>
-                      <a:pPr algn="l"/>
-                      <a:r>
-                        <a:rPr lang="de-DE" dirty="0"/>
-                        <a:t>09/2017</a:t>
-                      </a:r>
-                    </a:p>
-                  </a:txBody>
-                  <a:tcPr>
-                    <a:solidFill>
-                      <a:srgbClr val="92D050"/>
-                    </a:solidFill>
-                  </a:tcPr>
-                </a:tc>
-                <a:tc>
-                  <a:txBody>
-                    <a:bodyPr/>
-                    <a:lstStyle/>
-                    <a:p>
-                      <a:pPr algn="l"/>
-                      <a:endParaRPr lang="de-DE" dirty="0"/>
-                    </a:p>
-                  </a:txBody>
-                  <a:tcPr/>
-                </a:tc>
-                <a:tc>
-                  <a:txBody>
-                    <a:bodyPr/>
-                    <a:lstStyle/>
-                    <a:p>
-                      <a:pPr algn="l"/>
-                      <a:r>
-                        <a:rPr lang="de-DE" dirty="0"/>
-                        <a:t>03/2018</a:t>
-                      </a:r>
-                    </a:p>
-                  </a:txBody>
-                  <a:tcPr>
-                    <a:solidFill>
-                      <a:srgbClr val="92D050"/>
-                    </a:solidFill>
-                  </a:tcPr>
-                </a:tc>
-                <a:tc>
-                  <a:txBody>
-                    <a:bodyPr/>
-                    <a:lstStyle/>
-                    <a:p>
-                      <a:pPr algn="l"/>
-                      <a:r>
-                        <a:rPr lang="de-DE" dirty="0"/>
-                        <a:t>02/2017</a:t>
-                      </a:r>
-                    </a:p>
-                  </a:txBody>
-                  <a:tcPr>
-                    <a:solidFill>
-                      <a:srgbClr val="92D050"/>
-                    </a:solidFill>
-                  </a:tcPr>
-                </a:tc>
-                <a:tc>
-                  <a:txBody>
-                    <a:bodyPr/>
-                    <a:lstStyle/>
-                    <a:p>
-                      <a:pPr algn="l"/>
-                      <a:endParaRPr lang="de-DE" dirty="0"/>
-                    </a:p>
-                  </a:txBody>
-                  <a:tcPr/>
-                </a:tc>
-                <a:extLst>
-                  <a:ext uri="{0D108BD9-81ED-4DB2-BD59-A6C34878D82A}">
-                    <a16:rowId xmlns:a16="http://schemas.microsoft.com/office/drawing/2014/main" val="124811157"/>
-                  </a:ext>
-                </a:extLst>
-              </a:tr>
-              <a:tr h="371149">
-                <a:tc vMerge="1">
-                  <a:txBody>
-                    <a:bodyPr/>
-                    <a:lstStyle/>
-                    <a:p>
-                      <a:endParaRPr lang="de-DE" dirty="0"/>
-                    </a:p>
-                  </a:txBody>
-                  <a:tcPr/>
-                </a:tc>
-                <a:tc>
-                  <a:txBody>
-                    <a:bodyPr/>
-                    <a:lstStyle/>
-                    <a:p>
-                      <a:pPr algn="l"/>
-                      <a:r>
-                        <a:rPr lang="de-DE" dirty="0"/>
-                        <a:t>Min. 3 aktive </a:t>
-                      </a:r>
-                      <a:r>
-                        <a:rPr lang="de-DE" dirty="0" err="1"/>
-                        <a:t>Commiter</a:t>
-                      </a:r>
-                      <a:endParaRPr lang="de-DE" dirty="0"/>
-                    </a:p>
-                  </a:txBody>
-                  <a:tcPr/>
-                </a:tc>
-                <a:tc>
-                  <a:txBody>
-                    <a:bodyPr/>
-                    <a:lstStyle/>
-                    <a:p>
-                      <a:pPr algn="l"/>
-                      <a:r>
-                        <a:rPr lang="de-DE" dirty="0"/>
-                        <a:t>Ja</a:t>
-                      </a:r>
-                    </a:p>
-                  </a:txBody>
-                  <a:tcPr>
-                    <a:solidFill>
-                      <a:srgbClr val="92D050"/>
-                    </a:solidFill>
-                  </a:tcPr>
-                </a:tc>
-                <a:tc>
-                  <a:txBody>
-                    <a:bodyPr/>
-                    <a:lstStyle/>
-                    <a:p>
-                      <a:pPr algn="l"/>
-                      <a:r>
-                        <a:rPr lang="de-DE" dirty="0"/>
-                        <a:t>Ja</a:t>
-                      </a:r>
-                    </a:p>
-                  </a:txBody>
-                  <a:tcPr>
-                    <a:solidFill>
-                      <a:srgbClr val="92D050"/>
-                    </a:solidFill>
-                  </a:tcPr>
-                </a:tc>
-                <a:tc>
-                  <a:txBody>
-                    <a:bodyPr/>
-                    <a:lstStyle/>
-                    <a:p>
-                      <a:pPr algn="l"/>
-                      <a:endParaRPr lang="de-DE" dirty="0"/>
-                    </a:p>
-                  </a:txBody>
-                  <a:tcPr/>
-                </a:tc>
-                <a:tc>
-                  <a:txBody>
-                    <a:bodyPr/>
-                    <a:lstStyle/>
-                    <a:p>
-                      <a:pPr algn="l"/>
-                      <a:endParaRPr lang="de-DE" dirty="0"/>
-                    </a:p>
-                  </a:txBody>
-                  <a:tcPr/>
-                </a:tc>
-                <a:tc>
-                  <a:txBody>
-                    <a:bodyPr/>
-                    <a:lstStyle/>
-                    <a:p>
-                      <a:pPr algn="l"/>
-                      <a:endParaRPr lang="de-DE" dirty="0"/>
-                    </a:p>
-                  </a:txBody>
-                  <a:tcPr/>
-                </a:tc>
-                <a:tc>
-                  <a:txBody>
-                    <a:bodyPr/>
-                    <a:lstStyle/>
-                    <a:p>
-                      <a:pPr algn="l"/>
-                      <a:endParaRPr lang="de-DE" dirty="0"/>
-                    </a:p>
-                  </a:txBody>
-                  <a:tcPr/>
-                </a:tc>
-                <a:extLst>
-                  <a:ext uri="{0D108BD9-81ED-4DB2-BD59-A6C34878D82A}">
-                    <a16:rowId xmlns:a16="http://schemas.microsoft.com/office/drawing/2014/main" val="510005107"/>
-                  </a:ext>
-                </a:extLst>
-              </a:tr>
-              <a:tr h="371149">
-                <a:tc vMerge="1">
-                  <a:txBody>
-                    <a:bodyPr/>
-                    <a:lstStyle/>
-                    <a:p>
-                      <a:endParaRPr lang="de-DE" dirty="0"/>
-                    </a:p>
-                  </a:txBody>
-                  <a:tcPr anchor="ctr"/>
-                </a:tc>
-                <a:tc>
-                  <a:txBody>
-                    <a:bodyPr/>
-                    <a:lstStyle/>
-                    <a:p>
-                      <a:pPr algn="l"/>
-                      <a:r>
-                        <a:rPr lang="de-DE" dirty="0"/>
-                        <a:t>Min. 1 Commit / Monat</a:t>
-                      </a:r>
-                    </a:p>
-                  </a:txBody>
-                  <a:tcPr/>
-                </a:tc>
-                <a:tc>
-                  <a:txBody>
-                    <a:bodyPr/>
-                    <a:lstStyle/>
-                    <a:p>
-                      <a:pPr algn="l"/>
-                      <a:r>
-                        <a:rPr lang="de-DE" dirty="0"/>
-                        <a:t>Ja</a:t>
-                      </a:r>
-                    </a:p>
-                  </a:txBody>
-                  <a:tcPr/>
-                </a:tc>
-                <a:tc>
-                  <a:txBody>
-                    <a:bodyPr/>
-                    <a:lstStyle/>
-                    <a:p>
-                      <a:pPr algn="l"/>
-                      <a:r>
-                        <a:rPr lang="de-DE" dirty="0"/>
-                        <a:t>Ja</a:t>
-                      </a:r>
-                    </a:p>
-                  </a:txBody>
-                  <a:tcPr/>
-                </a:tc>
-                <a:tc>
-                  <a:txBody>
-                    <a:bodyPr/>
-                    <a:lstStyle/>
-                    <a:p>
-                      <a:pPr algn="l"/>
-                      <a:endParaRPr lang="de-DE" dirty="0"/>
-                    </a:p>
-                  </a:txBody>
-                  <a:tcPr/>
-                </a:tc>
-                <a:tc>
-                  <a:txBody>
-                    <a:bodyPr/>
-                    <a:lstStyle/>
-                    <a:p>
-                      <a:pPr algn="l"/>
-                      <a:endParaRPr lang="de-DE" dirty="0"/>
-                    </a:p>
-                  </a:txBody>
-                  <a:tcPr/>
-                </a:tc>
-                <a:tc>
-                  <a:txBody>
-                    <a:bodyPr/>
-                    <a:lstStyle/>
-                    <a:p>
-                      <a:pPr algn="l"/>
-                      <a:endParaRPr lang="de-DE" dirty="0"/>
-                    </a:p>
-                  </a:txBody>
-                  <a:tcPr/>
-                </a:tc>
-                <a:tc>
-                  <a:txBody>
-                    <a:bodyPr/>
-                    <a:lstStyle/>
-                    <a:p>
-                      <a:pPr algn="l"/>
-                      <a:endParaRPr lang="de-DE" dirty="0"/>
-                    </a:p>
-                  </a:txBody>
-                  <a:tcPr/>
-                </a:tc>
-                <a:extLst>
-                  <a:ext uri="{0D108BD9-81ED-4DB2-BD59-A6C34878D82A}">
-                    <a16:rowId xmlns:a16="http://schemas.microsoft.com/office/drawing/2014/main" val="1237157465"/>
-                  </a:ext>
-                </a:extLst>
-              </a:tr>
-            </a:tbl>
-          </a:graphicData>
-        </a:graphic>
-      </p:graphicFrame>
-    </p:spTree>
-    <p:extLst>
-      <p:ext uri="{BB962C8B-B14F-4D97-AF65-F5344CB8AC3E}">
-        <p14:creationId xmlns:p14="http://schemas.microsoft.com/office/powerpoint/2010/main" val="74394799"/>
-      </p:ext>
-    </p:extLst>
-  </p:cSld>
-  <p:clrMapOvr>
-    <a:masterClrMapping/>
-  </p:clrMapOvr>
-</p:sld>
-</file>
-
 <file path=ppt/slides/slide15.xml><?xml version="1.0" encoding="utf-8"?>
 <p:sld xmlns:a="http://schemas.openxmlformats.org/drawingml/2006/main" xmlns:r="http://schemas.openxmlformats.org/officeDocument/2006/relationships" xmlns:p="http://schemas.openxmlformats.org/presentationml/2006/main">
   <p:cSld>
@@ -7499,7 +5463,7 @@
           <a:p>
             <a:fld id="{BBFFFFB7-B427-4FC9-89B5-E815E530C709}" type="datetime1">
               <a:rPr lang="de-DE" smtClean="0"/>
-              <a:t>14.05.2018</a:t>
+              <a:t>21.05.2018</a:t>
             </a:fld>
             <a:endParaRPr lang="de-DE"/>
           </a:p>
@@ -7748,7 +5712,7 @@
           <a:p>
             <a:fld id="{5E3FA0F3-663C-4E4D-A9AD-FCEECA59737D}" type="datetime1">
               <a:rPr lang="de-DE" smtClean="0"/>
-              <a:t>14.05.2018</a:t>
+              <a:t>21.05.2018</a:t>
             </a:fld>
             <a:endParaRPr lang="de-DE"/>
           </a:p>
@@ -7866,12 +5830,8 @@
               <a:buNone/>
             </a:pPr>
             <a:r>
-              <a:rPr lang="de-DE"/>
-              <a:t>  Bilder </a:t>
-            </a:r>
-            <a:r>
               <a:rPr lang="de-DE" dirty="0"/>
-              <a:t>der Trennfolien: </a:t>
+              <a:t>  Bilder der Trennfolien: </a:t>
             </a:r>
             <a:r>
               <a:rPr lang="de-DE" dirty="0">
@@ -7881,13 +5841,8 @@
             </a:r>
             <a:r>
               <a:rPr lang="de-DE" dirty="0"/>
-              <a:t> (frei ohne Namensnennung nutzbar; </a:t>
-            </a:r>
-            <a:r>
-              <a:rPr lang="de-DE"/>
-              <a:t>CC0 Lizenz)</a:t>
-            </a:r>
-            <a:endParaRPr lang="de-DE" dirty="0"/>
+              <a:t> (frei ohne Namensnennung nutzbar; CC0 Lizenz)</a:t>
+            </a:r>
           </a:p>
           <a:p>
             <a:r>
@@ -7902,6 +5857,96 @@
             </a:r>
             <a:endParaRPr lang="de-DE" dirty="0"/>
           </a:p>
+          <a:p>
+            <a:r>
+              <a:rPr lang="de-DE" dirty="0" err="1"/>
+              <a:t>Locust</a:t>
+            </a:r>
+            <a:r>
+              <a:rPr lang="de-DE" dirty="0"/>
+              <a:t> Logo: </a:t>
+            </a:r>
+            <a:r>
+              <a:rPr lang="de-DE" dirty="0">
+                <a:hlinkClick r:id="rId4"/>
+              </a:rPr>
+              <a:t>https://locust.io</a:t>
+            </a:r>
+            <a:endParaRPr lang="de-DE" dirty="0"/>
+          </a:p>
+          <a:p>
+            <a:r>
+              <a:rPr lang="de-DE" dirty="0" err="1"/>
+              <a:t>NGrinder</a:t>
+            </a:r>
+            <a:r>
+              <a:rPr lang="de-DE" dirty="0"/>
+              <a:t> Logo: </a:t>
+            </a:r>
+            <a:r>
+              <a:rPr lang="de-DE" dirty="0">
+                <a:hlinkClick r:id="rId5"/>
+              </a:rPr>
+              <a:t>http://naver.github.io/ngrinder/</a:t>
+            </a:r>
+            <a:endParaRPr lang="de-DE" dirty="0"/>
+          </a:p>
+          <a:p>
+            <a:r>
+              <a:rPr lang="de-DE" dirty="0" err="1"/>
+              <a:t>Artillery</a:t>
+            </a:r>
+            <a:r>
+              <a:rPr lang="de-DE" dirty="0"/>
+              <a:t> Logo: </a:t>
+            </a:r>
+            <a:r>
+              <a:rPr lang="de-DE" dirty="0">
+                <a:hlinkClick r:id="rId6"/>
+              </a:rPr>
+              <a:t>https://artillery.io</a:t>
+            </a:r>
+            <a:endParaRPr lang="de-DE" dirty="0"/>
+          </a:p>
+          <a:p>
+            <a:r>
+              <a:rPr lang="de-DE" dirty="0"/>
+              <a:t>k6 Logo: </a:t>
+            </a:r>
+            <a:r>
+              <a:rPr lang="de-DE" dirty="0">
+                <a:hlinkClick r:id="rId7"/>
+              </a:rPr>
+              <a:t>https://k6.io</a:t>
+            </a:r>
+            <a:endParaRPr lang="de-DE" dirty="0"/>
+          </a:p>
+          <a:p>
+            <a:r>
+              <a:rPr lang="de-DE" dirty="0"/>
+              <a:t>Taurus Logo</a:t>
+            </a:r>
+            <a:r>
+              <a:rPr lang="de-DE"/>
+              <a:t>: </a:t>
+            </a:r>
+            <a:r>
+              <a:rPr lang="de-DE">
+                <a:hlinkClick r:id="rId8"/>
+              </a:rPr>
+              <a:t>https://gettaurus.org</a:t>
+            </a:r>
+            <a:endParaRPr lang="de-DE"/>
+          </a:p>
+          <a:p>
+            <a:endParaRPr lang="de-DE" dirty="0"/>
+          </a:p>
+          <a:p>
+            <a:endParaRPr lang="de-DE" dirty="0"/>
+          </a:p>
+          <a:p>
+            <a:endParaRPr lang="de-DE" dirty="0"/>
+          </a:p>
         </p:txBody>
       </p:sp>
       <p:sp>
@@ -7927,7 +5972,7 @@
           <a:p>
             <a:fld id="{928650A1-1A79-48B9-A942-815D58127345}" type="datetime1">
               <a:rPr lang="de-DE" smtClean="0"/>
-              <a:t>14.05.2018</a:t>
+              <a:t>21.05.2018</a:t>
             </a:fld>
             <a:endParaRPr lang="de-DE"/>
           </a:p>
@@ -8073,7 +6118,7 @@
           <a:p>
             <a:fld id="{BBFFFFB7-B427-4FC9-89B5-E815E530C709}" type="datetime1">
               <a:rPr lang="de-DE" smtClean="0"/>
-              <a:t>14.05.2018</a:t>
+              <a:t>21.05.2018</a:t>
             </a:fld>
             <a:endParaRPr lang="de-DE"/>
           </a:p>
@@ -8290,7 +6335,7 @@
           <a:p>
             <a:fld id="{5E3FA0F3-663C-4E4D-A9AD-FCEECA59737D}" type="datetime1">
               <a:rPr lang="de-DE" smtClean="0"/>
-              <a:t>14.05.2018</a:t>
+              <a:t>21.05.2018</a:t>
             </a:fld>
             <a:endParaRPr lang="de-DE"/>
           </a:p>
@@ -8547,7 +6592,7 @@
           <a:p>
             <a:fld id="{5E3FA0F3-663C-4E4D-A9AD-FCEECA59737D}" type="datetime1">
               <a:rPr lang="de-DE" smtClean="0"/>
-              <a:t>14.05.2018</a:t>
+              <a:t>21.05.2018</a:t>
             </a:fld>
             <a:endParaRPr lang="de-DE"/>
           </a:p>
@@ -8688,7 +6733,7 @@
           <a:p>
             <a:fld id="{BBFFFFB7-B427-4FC9-89B5-E815E530C709}" type="datetime1">
               <a:rPr lang="de-DE" smtClean="0"/>
-              <a:t>14.05.2018</a:t>
+              <a:t>21.05.2018</a:t>
             </a:fld>
             <a:endParaRPr lang="de-DE"/>
           </a:p>
@@ -8890,7 +6935,7 @@
           <a:p>
             <a:fld id="{40945502-2D6D-4EF3-B5E9-AD6E136212A6}" type="datetime1">
               <a:rPr lang="de-DE" smtClean="0"/>
-              <a:t>14.05.2018</a:t>
+              <a:t>21.05.2018</a:t>
             </a:fld>
             <a:endParaRPr lang="de-DE"/>
           </a:p>
@@ -9141,7 +7186,7 @@
           <a:p>
             <a:fld id="{BBFFFFB7-B427-4FC9-89B5-E815E530C709}" type="datetime1">
               <a:rPr lang="de-DE" smtClean="0"/>
-              <a:t>14.05.2018</a:t>
+              <a:t>21.05.2018</a:t>
             </a:fld>
             <a:endParaRPr lang="de-DE"/>
           </a:p>
@@ -9359,7 +7404,7 @@
           <a:p>
             <a:fld id="{BBFFFFB7-B427-4FC9-89B5-E815E530C709}" type="datetime1">
               <a:rPr lang="de-DE" smtClean="0"/>
-              <a:t>14.05.2018</a:t>
+              <a:t>21.05.2018</a:t>
             </a:fld>
             <a:endParaRPr lang="de-DE"/>
           </a:p>
@@ -9533,7 +7578,7 @@
           <a:p>
             <a:fld id="{BBFFFFB7-B427-4FC9-89B5-E815E530C709}" type="datetime1">
               <a:rPr lang="de-DE" smtClean="0"/>
-              <a:t>14.05.2018</a:t>
+              <a:t>21.05.2018</a:t>
             </a:fld>
             <a:endParaRPr lang="de-DE"/>
           </a:p>

</xml_diff>

<commit_message>
Refactored code. Currently no warning/code-smell/vulnerability in SonarQube.
</commit_message>
<xml_diff>
--- a/sqsdemoserver/LoadTesting.pptx
+++ b/sqsdemoserver/LoadTesting.pptx
@@ -222,7 +222,7 @@
           <a:p>
             <a:fld id="{7F7A1CCF-3A8B-40F6-A64D-2A4687177E43}" type="datetimeFigureOut">
               <a:rPr lang="de-DE" smtClean="0"/>
-              <a:t>10.06.2018</a:t>
+              <a:t>13.06.2018</a:t>
             </a:fld>
             <a:endParaRPr lang="de-DE"/>
           </a:p>
@@ -4244,7 +4244,7 @@
 </file>
 
 <file path=ppt/slides/slide10.xml><?xml version="1.0" encoding="utf-8"?>
-<p:sld xmlns:a="http://schemas.openxmlformats.org/drawingml/2006/main" xmlns:r="http://schemas.openxmlformats.org/officeDocument/2006/relationships" xmlns:p="http://schemas.openxmlformats.org/presentationml/2006/main">
+<p:sld xmlns:a="http://schemas.openxmlformats.org/drawingml/2006/main" xmlns:r="http://schemas.openxmlformats.org/officeDocument/2006/relationships" xmlns:p="http://schemas.openxmlformats.org/presentationml/2006/main" show="0">
   <p:cSld>
     <p:spTree>
       <p:nvGrpSpPr>
@@ -4991,7 +4991,7 @@
 </file>
 
 <file path=ppt/slides/slide12.xml><?xml version="1.0" encoding="utf-8"?>
-<p:sld xmlns:a="http://schemas.openxmlformats.org/drawingml/2006/main" xmlns:r="http://schemas.openxmlformats.org/officeDocument/2006/relationships" xmlns:p="http://schemas.openxmlformats.org/presentationml/2006/main">
+<p:sld xmlns:a="http://schemas.openxmlformats.org/drawingml/2006/main" xmlns:r="http://schemas.openxmlformats.org/officeDocument/2006/relationships" xmlns:p="http://schemas.openxmlformats.org/presentationml/2006/main" show="0">
   <p:cSld>
     <p:spTree>
       <p:nvGrpSpPr>
@@ -5682,7 +5682,7 @@
 </file>
 
 <file path=ppt/slides/slide14.xml><?xml version="1.0" encoding="utf-8"?>
-<p:sld xmlns:a="http://schemas.openxmlformats.org/drawingml/2006/main" xmlns:r="http://schemas.openxmlformats.org/officeDocument/2006/relationships" xmlns:p="http://schemas.openxmlformats.org/presentationml/2006/main">
+<p:sld xmlns:a="http://schemas.openxmlformats.org/drawingml/2006/main" xmlns:r="http://schemas.openxmlformats.org/officeDocument/2006/relationships" xmlns:p="http://schemas.openxmlformats.org/presentationml/2006/main" show="0">
   <p:cSld>
     <p:spTree>
       <p:nvGrpSpPr>
@@ -6421,7 +6421,7 @@
 </file>
 
 <file path=ppt/slides/slide16.xml><?xml version="1.0" encoding="utf-8"?>
-<p:sld xmlns:a="http://schemas.openxmlformats.org/drawingml/2006/main" xmlns:r="http://schemas.openxmlformats.org/officeDocument/2006/relationships" xmlns:p="http://schemas.openxmlformats.org/presentationml/2006/main">
+<p:sld xmlns:a="http://schemas.openxmlformats.org/drawingml/2006/main" xmlns:r="http://schemas.openxmlformats.org/officeDocument/2006/relationships" xmlns:p="http://schemas.openxmlformats.org/presentationml/2006/main" show="0">
   <p:cSld>
     <p:spTree>
       <p:nvGrpSpPr>
@@ -7158,7 +7158,7 @@
 </file>
 
 <file path=ppt/slides/slide18.xml><?xml version="1.0" encoding="utf-8"?>
-<p:sld xmlns:a="http://schemas.openxmlformats.org/drawingml/2006/main" xmlns:r="http://schemas.openxmlformats.org/officeDocument/2006/relationships" xmlns:p="http://schemas.openxmlformats.org/presentationml/2006/main">
+<p:sld xmlns:a="http://schemas.openxmlformats.org/drawingml/2006/main" xmlns:r="http://schemas.openxmlformats.org/officeDocument/2006/relationships" xmlns:p="http://schemas.openxmlformats.org/presentationml/2006/main" show="0">
   <p:cSld>
     <p:spTree>
       <p:nvGrpSpPr>
@@ -7981,13 +7981,18 @@
             </a:pPr>
             <a:r>
               <a:rPr lang="de-DE" dirty="0"/>
-              <a:t> Vorstellung von Open Source Tools für Lasttests inkl. Kurzem </a:t>
-            </a:r>
-            <a:r>
-              <a:rPr lang="de-DE" dirty="0" err="1"/>
-              <a:t>QuickCheck</a:t>
-            </a:r>
-            <a:endParaRPr lang="de-DE" dirty="0"/>
+              <a:t> Vorstellung von Open Source Tools für Lasttests</a:t>
+            </a:r>
+          </a:p>
+          <a:p>
+            <a:pPr>
+              <a:buFont typeface="Courier New" panose="02070309020205020404" pitchFamily="49" charset="0"/>
+              <a:buChar char="o"/>
+            </a:pPr>
+            <a:r>
+              <a:rPr lang="de-DE" dirty="0"/>
+              <a:t> Quick-Check</a:t>
+            </a:r>
           </a:p>
           <a:p>
             <a:pPr>
@@ -9945,7 +9950,7 @@
 </file>
 
 <file path=ppt/slides/slide6.xml><?xml version="1.0" encoding="utf-8"?>
-<p:sld xmlns:a="http://schemas.openxmlformats.org/drawingml/2006/main" xmlns:r="http://schemas.openxmlformats.org/officeDocument/2006/relationships" xmlns:p="http://schemas.openxmlformats.org/presentationml/2006/main">
+<p:sld xmlns:a="http://schemas.openxmlformats.org/drawingml/2006/main" xmlns:r="http://schemas.openxmlformats.org/officeDocument/2006/relationships" xmlns:p="http://schemas.openxmlformats.org/presentationml/2006/main" show="0">
   <p:cSld>
     <p:spTree>
       <p:nvGrpSpPr>
@@ -10664,7 +10669,7 @@
 </file>
 
 <file path=ppt/slides/slide8.xml><?xml version="1.0" encoding="utf-8"?>
-<p:sld xmlns:a="http://schemas.openxmlformats.org/drawingml/2006/main" xmlns:r="http://schemas.openxmlformats.org/officeDocument/2006/relationships" xmlns:p="http://schemas.openxmlformats.org/presentationml/2006/main">
+<p:sld xmlns:a="http://schemas.openxmlformats.org/drawingml/2006/main" xmlns:r="http://schemas.openxmlformats.org/officeDocument/2006/relationships" xmlns:p="http://schemas.openxmlformats.org/presentationml/2006/main" show="0">
   <p:cSld>
     <p:spTree>
       <p:nvGrpSpPr>

</xml_diff>